<commit_message>
Presentación Taller Grafos - BFS
</commit_message>
<xml_diff>
--- a/PRESENTACIÓN TALLER GRAFOS.pptx
+++ b/PRESENTACIÓN TALLER GRAFOS.pptx
@@ -5,7 +5,7 @@
     <p:sldMasterId id="2147483664" r:id="rId1"/>
   </p:sldMasterIdLst>
   <p:notesMasterIdLst>
-    <p:notesMasterId r:id="rId11"/>
+    <p:notesMasterId r:id="rId15"/>
   </p:notesMasterIdLst>
   <p:sldIdLst>
     <p:sldId id="258" r:id="rId2"/>
@@ -17,6 +17,10 @@
     <p:sldId id="263" r:id="rId8"/>
     <p:sldId id="265" r:id="rId9"/>
     <p:sldId id="264" r:id="rId10"/>
+    <p:sldId id="267" r:id="rId11"/>
+    <p:sldId id="266" r:id="rId12"/>
+    <p:sldId id="269" r:id="rId13"/>
+    <p:sldId id="268" r:id="rId14"/>
   </p:sldIdLst>
   <p:sldSz cx="9144000" cy="5143500" type="screen16x9"/>
   <p:notesSz cx="6858000" cy="9144000"/>
@@ -222,6 +226,22 @@
       </a:defRPr>
     </a:lvl9pPr>
   </p:defaultTextStyle>
+  <p:extLst>
+    <p:ext uri="{EFAFB233-063F-42B5-8137-9DF3F51BA10A}">
+      <p15:sldGuideLst xmlns:p15="http://schemas.microsoft.com/office/powerpoint/2012/main">
+        <p15:guide id="1" orient="horz" pos="1620">
+          <p15:clr>
+            <a:srgbClr val="A4A3A4"/>
+          </p15:clr>
+        </p15:guide>
+        <p15:guide id="2" pos="2880">
+          <p15:clr>
+            <a:srgbClr val="A4A3A4"/>
+          </p15:clr>
+        </p15:guide>
+      </p15:sldGuideLst>
+    </p:ext>
+  </p:extLst>
 </p:presentation>
 </file>
 
@@ -17221,13 +17241,661 @@
           <a:lstStyle/>
           <a:p>
             <a:r>
-              <a:rPr lang="es-CO" sz="2400" b="1" dirty="0" smtClean="0">
+              <a:rPr lang="es-CO" sz="2400" b="1" dirty="0">
                 <a:latin typeface="Berlin Sans FB Demi" panose="020E0802020502020306" pitchFamily="34" charset="0"/>
               </a:rPr>
               <a:t>INTRODUCCIÓN A LA TEORÍA DE GRAFOS</a:t>
             </a:r>
-            <a:endParaRPr lang="es-CO" sz="2400" b="1" dirty="0">
-              <a:latin typeface="Berlin Sans FB Demi" panose="020E0802020502020306" pitchFamily="34" charset="0"/>
+          </a:p>
+        </p:txBody>
+      </p:sp>
+    </p:spTree>
+    <p:extLst>
+      <p:ext uri="{BB962C8B-B14F-4D97-AF65-F5344CB8AC3E}">
+        <p14:creationId xmlns:p14="http://schemas.microsoft.com/office/powerpoint/2010/main" val="1617254423"/>
+      </p:ext>
+    </p:extLst>
+  </p:cSld>
+  <p:clrMapOvr>
+    <a:masterClrMapping/>
+  </p:clrMapOvr>
+</p:sld>
+</file>
+
+<file path=ppt/slides/slide10.xml><?xml version="1.0" encoding="utf-8"?>
+<p:sld xmlns:a="http://schemas.openxmlformats.org/drawingml/2006/main" xmlns:r="http://schemas.openxmlformats.org/officeDocument/2006/relationships" xmlns:p="http://schemas.openxmlformats.org/presentationml/2006/main">
+  <p:cSld>
+    <p:bg>
+      <p:bgPr>
+        <a:solidFill>
+          <a:schemeClr val="bg1"/>
+        </a:solidFill>
+        <a:effectLst/>
+      </p:bgPr>
+    </p:bg>
+    <p:spTree>
+      <p:nvGrpSpPr>
+        <p:cNvPr id="1" name=""/>
+        <p:cNvGrpSpPr/>
+        <p:nvPr/>
+      </p:nvGrpSpPr>
+      <p:grpSpPr>
+        <a:xfrm>
+          <a:off x="0" y="0"/>
+          <a:ext cx="0" cy="0"/>
+          <a:chOff x="0" y="0"/>
+          <a:chExt cx="0" cy="0"/>
+        </a:xfrm>
+      </p:grpSpPr>
+      <p:pic>
+        <p:nvPicPr>
+          <p:cNvPr id="4" name="Shape 143" descr="logosis1.png"/>
+          <p:cNvPicPr preferRelativeResize="0"/>
+          <p:nvPr/>
+        </p:nvPicPr>
+        <p:blipFill>
+          <a:blip r:embed="rId2">
+            <a:alphaModFix/>
+          </a:blip>
+          <a:stretch>
+            <a:fillRect/>
+          </a:stretch>
+        </p:blipFill>
+        <p:spPr>
+          <a:xfrm>
+            <a:off x="7249711" y="3723878"/>
+            <a:ext cx="1894288" cy="1419622"/>
+          </a:xfrm>
+          <a:prstGeom prst="rect">
+            <a:avLst/>
+          </a:prstGeom>
+          <a:noFill/>
+          <a:ln>
+            <a:noFill/>
+          </a:ln>
+        </p:spPr>
+      </p:pic>
+      <p:sp>
+        <p:nvSpPr>
+          <p:cNvPr id="5" name="4 CuadroTexto"/>
+          <p:cNvSpPr txBox="1"/>
+          <p:nvPr/>
+        </p:nvSpPr>
+        <p:spPr>
+          <a:xfrm>
+            <a:off x="213888" y="123478"/>
+            <a:ext cx="7035823" cy="646331"/>
+          </a:xfrm>
+          <a:prstGeom prst="rect">
+            <a:avLst/>
+          </a:prstGeom>
+          <a:noFill/>
+        </p:spPr>
+        <p:txBody>
+          <a:bodyPr wrap="square" rtlCol="0">
+            <a:spAutoFit/>
+          </a:bodyPr>
+          <a:lstStyle/>
+          <a:p>
+            <a:r>
+              <a:rPr lang="es-ES" sz="3600" b="1" dirty="0">
+                <a:ln w="12700">
+                  <a:solidFill>
+                    <a:schemeClr val="tx2">
+                      <a:satMod val="155000"/>
+                    </a:schemeClr>
+                  </a:solidFill>
+                  <a:prstDash val="solid"/>
+                </a:ln>
+                <a:solidFill>
+                  <a:schemeClr val="tx1"/>
+                </a:solidFill>
+                <a:effectLst>
+                  <a:outerShdw blurRad="41275" dist="20320" dir="1800000" algn="tl" rotWithShape="0">
+                    <a:srgbClr val="000000">
+                      <a:alpha val="40000"/>
+                    </a:srgbClr>
+                  </a:outerShdw>
+                </a:effectLst>
+                <a:latin typeface="Rockwell" panose="02060603020205020403" pitchFamily="18" charset="0"/>
+              </a:rPr>
+              <a:t>Lista de Adyacencia</a:t>
+            </a:r>
+            <a:endParaRPr lang="es-CO" sz="1200" dirty="0">
+              <a:latin typeface="Rockwell" panose="02060603020205020403" pitchFamily="18" charset="0"/>
+            </a:endParaRPr>
+          </a:p>
+        </p:txBody>
+      </p:sp>
+      <p:sp>
+        <p:nvSpPr>
+          <p:cNvPr id="7" name="6 CuadroTexto"/>
+          <p:cNvSpPr txBox="1"/>
+          <p:nvPr/>
+        </p:nvSpPr>
+        <p:spPr>
+          <a:xfrm>
+            <a:off x="141880" y="827876"/>
+            <a:ext cx="7382448" cy="1815882"/>
+          </a:xfrm>
+          <a:prstGeom prst="rect">
+            <a:avLst/>
+          </a:prstGeom>
+          <a:noFill/>
+        </p:spPr>
+        <p:txBody>
+          <a:bodyPr wrap="square" rtlCol="0">
+            <a:spAutoFit/>
+          </a:bodyPr>
+          <a:lstStyle/>
+          <a:p>
+            <a:r>
+              <a:rPr lang="es-CO" sz="2800" b="1" dirty="0">
+                <a:solidFill>
+                  <a:srgbClr val="002060"/>
+                </a:solidFill>
+                <a:latin typeface="Gabriola" panose="04040605051002020D02" pitchFamily="82" charset="0"/>
+                <a:cs typeface="DaunPenh" panose="01010101010101010101" pitchFamily="2" charset="0"/>
+              </a:rPr>
+              <a:t>Una </a:t>
+            </a:r>
+            <a:r>
+              <a:rPr lang="es-CO" sz="2800" b="1" dirty="0">
+                <a:solidFill>
+                  <a:schemeClr val="accent1">
+                    <a:lumMod val="50000"/>
+                  </a:schemeClr>
+                </a:solidFill>
+                <a:latin typeface="Gabriola" panose="04040605051002020D02" pitchFamily="82" charset="0"/>
+                <a:cs typeface="DaunPenh" panose="01010101010101010101" pitchFamily="2" charset="0"/>
+              </a:rPr>
+              <a:t>lista de adyacencia</a:t>
+            </a:r>
+            <a:r>
+              <a:rPr lang="es-CO" sz="2800" b="1" dirty="0">
+                <a:solidFill>
+                  <a:srgbClr val="002060"/>
+                </a:solidFill>
+                <a:latin typeface="Gabriola" panose="04040605051002020D02" pitchFamily="82" charset="0"/>
+                <a:cs typeface="DaunPenh" panose="01010101010101010101" pitchFamily="2" charset="0"/>
+              </a:rPr>
+              <a:t> es una representación de todas las aristas de un grafo mediante una lista.</a:t>
+            </a:r>
+            <a:r>
+              <a:rPr lang="es-CO" dirty="0"/>
+              <a:t> </a:t>
+            </a:r>
+            <a:r>
+              <a:rPr lang="es-CO" sz="2800" b="1" dirty="0">
+                <a:solidFill>
+                  <a:srgbClr val="002060"/>
+                </a:solidFill>
+                <a:latin typeface="Gabriola" panose="04040605051002020D02" pitchFamily="82" charset="0"/>
+                <a:cs typeface="DaunPenh" panose="01010101010101010101" pitchFamily="2" charset="0"/>
+              </a:rPr>
+              <a:t>Se asocia a cada nodo del grafo una lista que contenga todos aquellos nodos que sean adyacentes a él.</a:t>
+            </a:r>
+          </a:p>
+          <a:p>
+            <a:endParaRPr lang="es-CO" sz="2800" b="1" dirty="0">
+              <a:solidFill>
+                <a:srgbClr val="002060"/>
+              </a:solidFill>
+              <a:latin typeface="Gabriola" panose="04040605051002020D02" pitchFamily="82" charset="0"/>
+              <a:cs typeface="DaunPenh" panose="01010101010101010101" pitchFamily="2" charset="0"/>
+            </a:endParaRPr>
+          </a:p>
+        </p:txBody>
+      </p:sp>
+      <p:pic>
+        <p:nvPicPr>
+          <p:cNvPr id="8" name="Imagen 7"/>
+          <p:cNvPicPr>
+            <a:picLocks noChangeAspect="1"/>
+          </p:cNvPicPr>
+          <p:nvPr/>
+        </p:nvPicPr>
+        <p:blipFill>
+          <a:blip r:embed="rId3"/>
+          <a:stretch>
+            <a:fillRect/>
+          </a:stretch>
+        </p:blipFill>
+        <p:spPr>
+          <a:xfrm>
+            <a:off x="305338" y="2569717"/>
+            <a:ext cx="6498910" cy="2162273"/>
+          </a:xfrm>
+          <a:prstGeom prst="rect">
+            <a:avLst/>
+          </a:prstGeom>
+        </p:spPr>
+      </p:pic>
+    </p:spTree>
+    <p:extLst>
+      <p:ext uri="{BB962C8B-B14F-4D97-AF65-F5344CB8AC3E}">
+        <p14:creationId xmlns:p14="http://schemas.microsoft.com/office/powerpoint/2010/main" val="1526532328"/>
+      </p:ext>
+    </p:extLst>
+  </p:cSld>
+  <p:clrMapOvr>
+    <a:masterClrMapping/>
+  </p:clrMapOvr>
+</p:sld>
+</file>
+
+<file path=ppt/slides/slide11.xml><?xml version="1.0" encoding="utf-8"?>
+<p:sld xmlns:a="http://schemas.openxmlformats.org/drawingml/2006/main" xmlns:r="http://schemas.openxmlformats.org/officeDocument/2006/relationships" xmlns:p="http://schemas.openxmlformats.org/presentationml/2006/main" showMasterSp="0">
+  <p:cSld>
+    <p:bg>
+      <p:bgPr>
+        <a:solidFill>
+          <a:schemeClr val="tx2"/>
+        </a:solidFill>
+        <a:effectLst/>
+      </p:bgPr>
+    </p:bg>
+    <p:spTree>
+      <p:nvGrpSpPr>
+        <p:cNvPr id="1" name=""/>
+        <p:cNvGrpSpPr/>
+        <p:nvPr/>
+      </p:nvGrpSpPr>
+      <p:grpSpPr>
+        <a:xfrm>
+          <a:off x="0" y="0"/>
+          <a:ext cx="0" cy="0"/>
+          <a:chOff x="0" y="0"/>
+          <a:chExt cx="0" cy="0"/>
+        </a:xfrm>
+      </p:grpSpPr>
+      <p:pic>
+        <p:nvPicPr>
+          <p:cNvPr id="4" name="Shape 143" descr="logosis1.png"/>
+          <p:cNvPicPr preferRelativeResize="0"/>
+          <p:nvPr/>
+        </p:nvPicPr>
+        <p:blipFill>
+          <a:blip r:embed="rId2">
+            <a:alphaModFix/>
+          </a:blip>
+          <a:stretch>
+            <a:fillRect/>
+          </a:stretch>
+        </p:blipFill>
+        <p:spPr>
+          <a:xfrm>
+            <a:off x="7884368" y="4011910"/>
+            <a:ext cx="1259631" cy="1131590"/>
+          </a:xfrm>
+          <a:prstGeom prst="rect">
+            <a:avLst/>
+          </a:prstGeom>
+          <a:noFill/>
+          <a:ln>
+            <a:noFill/>
+          </a:ln>
+        </p:spPr>
+      </p:pic>
+      <p:sp>
+        <p:nvSpPr>
+          <p:cNvPr id="5" name="4 CuadroTexto"/>
+          <p:cNvSpPr txBox="1"/>
+          <p:nvPr/>
+        </p:nvSpPr>
+        <p:spPr>
+          <a:xfrm>
+            <a:off x="35496" y="125219"/>
+            <a:ext cx="7344816" cy="646331"/>
+          </a:xfrm>
+          <a:prstGeom prst="rect">
+            <a:avLst/>
+          </a:prstGeom>
+          <a:noFill/>
+        </p:spPr>
+        <p:txBody>
+          <a:bodyPr wrap="square" rtlCol="0">
+            <a:spAutoFit/>
+          </a:bodyPr>
+          <a:lstStyle/>
+          <a:p>
+            <a:r>
+              <a:rPr lang="es-CO" sz="3600" b="1" dirty="0">
+                <a:ln w="12700">
+                  <a:solidFill>
+                    <a:schemeClr val="tx2">
+                      <a:satMod val="155000"/>
+                    </a:schemeClr>
+                  </a:solidFill>
+                  <a:prstDash val="solid"/>
+                </a:ln>
+                <a:solidFill>
+                  <a:schemeClr val="tx1"/>
+                </a:solidFill>
+                <a:effectLst>
+                  <a:outerShdw blurRad="41275" dist="20320" dir="1800000" algn="tl" rotWithShape="0">
+                    <a:srgbClr val="000000">
+                      <a:alpha val="40000"/>
+                    </a:srgbClr>
+                  </a:outerShdw>
+                </a:effectLst>
+                <a:latin typeface="Rockwell" panose="02060603020205020403" pitchFamily="18" charset="0"/>
+              </a:rPr>
+              <a:t>Búsqueda Primero en Anchura</a:t>
+            </a:r>
+          </a:p>
+        </p:txBody>
+      </p:sp>
+      <p:sp>
+        <p:nvSpPr>
+          <p:cNvPr id="7" name="6 CuadroTexto"/>
+          <p:cNvSpPr txBox="1"/>
+          <p:nvPr/>
+        </p:nvSpPr>
+        <p:spPr>
+          <a:xfrm>
+            <a:off x="35497" y="843558"/>
+            <a:ext cx="8640959" cy="4154984"/>
+          </a:xfrm>
+          <a:prstGeom prst="rect">
+            <a:avLst/>
+          </a:prstGeom>
+          <a:noFill/>
+        </p:spPr>
+        <p:txBody>
+          <a:bodyPr wrap="square" rtlCol="0">
+            <a:spAutoFit/>
+          </a:bodyPr>
+          <a:lstStyle/>
+          <a:p>
+            <a:r>
+              <a:rPr lang="es-CO" sz="2400" dirty="0" err="1">
+                <a:solidFill>
+                  <a:schemeClr val="accent1">
+                    <a:lumMod val="50000"/>
+                  </a:schemeClr>
+                </a:solidFill>
+                <a:latin typeface="Gabriola" panose="04040605051002020D02" pitchFamily="82" charset="0"/>
+                <a:cs typeface="DaunPenh" panose="01010101010101010101" pitchFamily="2" charset="0"/>
+              </a:rPr>
+              <a:t>Breadth</a:t>
+            </a:r>
+            <a:r>
+              <a:rPr lang="es-CO" sz="2400" dirty="0">
+                <a:solidFill>
+                  <a:schemeClr val="accent1">
+                    <a:lumMod val="50000"/>
+                  </a:schemeClr>
+                </a:solidFill>
+                <a:latin typeface="Gabriola" panose="04040605051002020D02" pitchFamily="82" charset="0"/>
+                <a:cs typeface="DaunPenh" panose="01010101010101010101" pitchFamily="2" charset="0"/>
+              </a:rPr>
+              <a:t> </a:t>
+            </a:r>
+            <a:r>
+              <a:rPr lang="es-CO" sz="2400" dirty="0" err="1">
+                <a:solidFill>
+                  <a:schemeClr val="accent1">
+                    <a:lumMod val="50000"/>
+                  </a:schemeClr>
+                </a:solidFill>
+                <a:latin typeface="Gabriola" panose="04040605051002020D02" pitchFamily="82" charset="0"/>
+                <a:cs typeface="DaunPenh" panose="01010101010101010101" pitchFamily="2" charset="0"/>
+              </a:rPr>
+              <a:t>First</a:t>
+            </a:r>
+            <a:r>
+              <a:rPr lang="es-CO" sz="2400" dirty="0">
+                <a:solidFill>
+                  <a:schemeClr val="accent1">
+                    <a:lumMod val="50000"/>
+                  </a:schemeClr>
+                </a:solidFill>
+                <a:latin typeface="Gabriola" panose="04040605051002020D02" pitchFamily="82" charset="0"/>
+                <a:cs typeface="DaunPenh" panose="01010101010101010101" pitchFamily="2" charset="0"/>
+              </a:rPr>
+              <a:t> </a:t>
+            </a:r>
+            <a:r>
+              <a:rPr lang="es-CO" sz="2400" dirty="0" err="1">
+                <a:solidFill>
+                  <a:schemeClr val="accent1">
+                    <a:lumMod val="50000"/>
+                  </a:schemeClr>
+                </a:solidFill>
+                <a:latin typeface="Gabriola" panose="04040605051002020D02" pitchFamily="82" charset="0"/>
+                <a:cs typeface="DaunPenh" panose="01010101010101010101" pitchFamily="2" charset="0"/>
+              </a:rPr>
+              <a:t>Search</a:t>
+            </a:r>
+            <a:r>
+              <a:rPr lang="es-CO" sz="2400" dirty="0">
+                <a:solidFill>
+                  <a:schemeClr val="accent1">
+                    <a:lumMod val="50000"/>
+                  </a:schemeClr>
+                </a:solidFill>
+                <a:latin typeface="Gabriola" panose="04040605051002020D02" pitchFamily="82" charset="0"/>
+                <a:cs typeface="DaunPenh" panose="01010101010101010101" pitchFamily="2" charset="0"/>
+              </a:rPr>
+              <a:t> </a:t>
+            </a:r>
+            <a:r>
+              <a:rPr lang="es-CO" sz="2400" dirty="0">
+                <a:solidFill>
+                  <a:srgbClr val="002060"/>
+                </a:solidFill>
+                <a:latin typeface="Gabriola" panose="04040605051002020D02" pitchFamily="82" charset="0"/>
+                <a:cs typeface="DaunPenh" panose="01010101010101010101" pitchFamily="2" charset="0"/>
+              </a:rPr>
+              <a:t>abreviado como </a:t>
+            </a:r>
+            <a:r>
+              <a:rPr lang="es-CO" sz="2400" dirty="0">
+                <a:solidFill>
+                  <a:schemeClr val="accent1">
+                    <a:lumMod val="50000"/>
+                  </a:schemeClr>
+                </a:solidFill>
+                <a:latin typeface="Gabriola" panose="04040605051002020D02" pitchFamily="82" charset="0"/>
+                <a:cs typeface="DaunPenh" panose="01010101010101010101" pitchFamily="2" charset="0"/>
+              </a:rPr>
+              <a:t>BFS</a:t>
+            </a:r>
+            <a:r>
+              <a:rPr lang="es-CO" sz="2400" dirty="0">
+                <a:solidFill>
+                  <a:srgbClr val="002060"/>
+                </a:solidFill>
+                <a:latin typeface="Gabriola" panose="04040605051002020D02" pitchFamily="82" charset="0"/>
+                <a:cs typeface="DaunPenh" panose="01010101010101010101" pitchFamily="2" charset="0"/>
+              </a:rPr>
+              <a:t>, es otro algoritmo de recorrido de grafos. Partiendo de un vértice fuente (inicial) conocido, el </a:t>
+            </a:r>
+            <a:r>
+              <a:rPr lang="es-CO" sz="2400" dirty="0">
+                <a:solidFill>
+                  <a:schemeClr val="accent1">
+                    <a:lumMod val="50000"/>
+                  </a:schemeClr>
+                </a:solidFill>
+                <a:latin typeface="Gabriola" panose="04040605051002020D02" pitchFamily="82" charset="0"/>
+                <a:cs typeface="DaunPenh" panose="01010101010101010101" pitchFamily="2" charset="0"/>
+              </a:rPr>
+              <a:t>BFS</a:t>
+            </a:r>
+            <a:r>
+              <a:rPr lang="es-CO" sz="2400" dirty="0">
+                <a:solidFill>
+                  <a:srgbClr val="002060"/>
+                </a:solidFill>
+                <a:latin typeface="Gabriola" panose="04040605051002020D02" pitchFamily="82" charset="0"/>
+                <a:cs typeface="DaunPenh" panose="01010101010101010101" pitchFamily="2" charset="0"/>
+              </a:rPr>
+              <a:t> recorrerá el grafo “primero en anchura”. Esto es porque el </a:t>
+            </a:r>
+            <a:r>
+              <a:rPr lang="es-CO" sz="2400" dirty="0">
+                <a:solidFill>
+                  <a:schemeClr val="accent1">
+                    <a:lumMod val="50000"/>
+                  </a:schemeClr>
+                </a:solidFill>
+                <a:latin typeface="Gabriola" panose="04040605051002020D02" pitchFamily="82" charset="0"/>
+                <a:cs typeface="DaunPenh" panose="01010101010101010101" pitchFamily="2" charset="0"/>
+              </a:rPr>
+              <a:t>BFS</a:t>
+            </a:r>
+            <a:r>
+              <a:rPr lang="es-CO" sz="2400" dirty="0">
+                <a:solidFill>
+                  <a:srgbClr val="002060"/>
+                </a:solidFill>
+                <a:latin typeface="Gabriola" panose="04040605051002020D02" pitchFamily="82" charset="0"/>
+                <a:cs typeface="DaunPenh" panose="01010101010101010101" pitchFamily="2" charset="0"/>
+              </a:rPr>
+              <a:t> visitará los nodos que son directamente vecinos del nodo inicial (primera capa), después los vecinos de los directamente vecinos (segunda capa) y así sucesivamente, capa por capa. </a:t>
+            </a:r>
+            <a:r>
+              <a:rPr lang="es-CO" sz="2400" dirty="0">
+                <a:solidFill>
+                  <a:schemeClr val="accent2">
+                    <a:lumMod val="50000"/>
+                  </a:schemeClr>
+                </a:solidFill>
+                <a:latin typeface="Gabriola" panose="04040605051002020D02" pitchFamily="82" charset="0"/>
+                <a:cs typeface="DaunPenh" panose="01010101010101010101" pitchFamily="2" charset="0"/>
+              </a:rPr>
+              <a:t>El </a:t>
+            </a:r>
+            <a:r>
+              <a:rPr lang="es-CO" sz="2400" dirty="0">
+                <a:solidFill>
+                  <a:schemeClr val="accent1">
+                    <a:lumMod val="50000"/>
+                  </a:schemeClr>
+                </a:solidFill>
+                <a:latin typeface="Gabriola" panose="04040605051002020D02" pitchFamily="82" charset="0"/>
+                <a:cs typeface="DaunPenh" panose="01010101010101010101" pitchFamily="2" charset="0"/>
+              </a:rPr>
+              <a:t>BFS </a:t>
+            </a:r>
+            <a:r>
+              <a:rPr lang="es-CO" sz="2400" dirty="0">
+                <a:solidFill>
+                  <a:srgbClr val="002060"/>
+                </a:solidFill>
+                <a:latin typeface="Gabriola" panose="04040605051002020D02" pitchFamily="82" charset="0"/>
+                <a:cs typeface="DaunPenh" panose="01010101010101010101" pitchFamily="2" charset="0"/>
+              </a:rPr>
+              <a:t>empieza con la inserción del nodo inicial a la cola, luego procesa la cola de la siguiente manera: Saca el nodo U superior de la cola, y desencola todos los vecinos no visitados de U, y los marca como visitados. Con la ayuda de la cola, el </a:t>
+            </a:r>
+            <a:r>
+              <a:rPr lang="es-CO" sz="2400" dirty="0">
+                <a:solidFill>
+                  <a:schemeClr val="accent1">
+                    <a:lumMod val="50000"/>
+                  </a:schemeClr>
+                </a:solidFill>
+                <a:latin typeface="Gabriola" panose="04040605051002020D02" pitchFamily="82" charset="0"/>
+                <a:cs typeface="DaunPenh" panose="01010101010101010101" pitchFamily="2" charset="0"/>
+              </a:rPr>
+              <a:t>BFS</a:t>
+            </a:r>
+            <a:r>
+              <a:rPr lang="es-CO" sz="2400" dirty="0">
+                <a:solidFill>
+                  <a:srgbClr val="002060"/>
+                </a:solidFill>
+                <a:latin typeface="Gabriola" panose="04040605051002020D02" pitchFamily="82" charset="0"/>
+                <a:cs typeface="DaunPenh" panose="01010101010101010101" pitchFamily="2" charset="0"/>
+              </a:rPr>
+              <a:t> visitará el nodo inicial y todos los nodos del componente conectado que contiene el nodo inicial capa por capa.</a:t>
+            </a:r>
+          </a:p>
+          <a:p>
+            <a:r>
+              <a:rPr lang="es-CO" sz="2400" dirty="0">
+                <a:solidFill>
+                  <a:srgbClr val="002060"/>
+                </a:solidFill>
+                <a:latin typeface="Gabriola" panose="04040605051002020D02" pitchFamily="82" charset="0"/>
+                <a:cs typeface="DaunPenh" panose="01010101010101010101" pitchFamily="2" charset="0"/>
+              </a:rPr>
+              <a:t>El algoritmo </a:t>
+            </a:r>
+            <a:r>
+              <a:rPr lang="es-CO" sz="2400" dirty="0">
+                <a:solidFill>
+                  <a:schemeClr val="accent1">
+                    <a:lumMod val="50000"/>
+                  </a:schemeClr>
+                </a:solidFill>
+                <a:latin typeface="Gabriola" panose="04040605051002020D02" pitchFamily="82" charset="0"/>
+                <a:cs typeface="DaunPenh" panose="01010101010101010101" pitchFamily="2" charset="0"/>
+              </a:rPr>
+              <a:t>BFS </a:t>
+            </a:r>
+            <a:r>
+              <a:rPr lang="es-CO" sz="2400" dirty="0">
+                <a:solidFill>
+                  <a:srgbClr val="002060"/>
+                </a:solidFill>
+                <a:latin typeface="Gabriola" panose="04040605051002020D02" pitchFamily="82" charset="0"/>
+                <a:cs typeface="DaunPenh" panose="01010101010101010101" pitchFamily="2" charset="0"/>
+              </a:rPr>
+              <a:t>se ejecuta en O(V + E) usando una </a:t>
+            </a:r>
+            <a:r>
+              <a:rPr lang="es-CO" sz="2400" dirty="0">
+                <a:solidFill>
+                  <a:schemeClr val="accent1">
+                    <a:lumMod val="50000"/>
+                  </a:schemeClr>
+                </a:solidFill>
+                <a:latin typeface="Gabriola" panose="04040605051002020D02" pitchFamily="82" charset="0"/>
+                <a:cs typeface="DaunPenh" panose="01010101010101010101" pitchFamily="2" charset="0"/>
+              </a:rPr>
+              <a:t>lista de adyacencia </a:t>
+            </a:r>
+            <a:r>
+              <a:rPr lang="es-CO" sz="2400" dirty="0">
+                <a:solidFill>
+                  <a:srgbClr val="002060"/>
+                </a:solidFill>
+                <a:latin typeface="Gabriola" panose="04040605051002020D02" pitchFamily="82" charset="0"/>
+                <a:cs typeface="DaunPenh" panose="01010101010101010101" pitchFamily="2" charset="0"/>
+              </a:rPr>
+              <a:t>y en O(V^2) usando una </a:t>
+            </a:r>
+            <a:r>
+              <a:rPr lang="es-CO" sz="2400" dirty="0">
+                <a:solidFill>
+                  <a:schemeClr val="accent1">
+                    <a:lumMod val="50000"/>
+                  </a:schemeClr>
+                </a:solidFill>
+                <a:latin typeface="Gabriola" panose="04040605051002020D02" pitchFamily="82" charset="0"/>
+                <a:cs typeface="DaunPenh" panose="01010101010101010101" pitchFamily="2" charset="0"/>
+              </a:rPr>
+              <a:t>matriz de adyacencia</a:t>
+            </a:r>
+            <a:r>
+              <a:rPr lang="es-CO" sz="2400" dirty="0">
+                <a:solidFill>
+                  <a:srgbClr val="002060"/>
+                </a:solidFill>
+                <a:latin typeface="Gabriola" panose="04040605051002020D02" pitchFamily="82" charset="0"/>
+                <a:cs typeface="DaunPenh" panose="01010101010101010101" pitchFamily="2" charset="0"/>
+              </a:rPr>
+              <a:t>.</a:t>
+            </a:r>
+            <a:endParaRPr lang="es-CO" sz="2800" dirty="0">
+              <a:solidFill>
+                <a:srgbClr val="002060"/>
+              </a:solidFill>
+              <a:latin typeface="Gabriola" panose="04040605051002020D02" pitchFamily="82" charset="0"/>
+              <a:cs typeface="DaunPenh" panose="01010101010101010101" pitchFamily="2" charset="0"/>
             </a:endParaRPr>
           </a:p>
         </p:txBody>
@@ -17235,7 +17903,371 @@
     </p:spTree>
     <p:extLst>
       <p:ext uri="{BB962C8B-B14F-4D97-AF65-F5344CB8AC3E}">
-        <p14:creationId xmlns:p14="http://schemas.microsoft.com/office/powerpoint/2010/main" val="1617254423"/>
+        <p14:creationId xmlns:p14="http://schemas.microsoft.com/office/powerpoint/2010/main" val="2410502723"/>
+      </p:ext>
+    </p:extLst>
+  </p:cSld>
+  <p:clrMapOvr>
+    <a:masterClrMapping/>
+  </p:clrMapOvr>
+</p:sld>
+</file>
+
+<file path=ppt/slides/slide12.xml><?xml version="1.0" encoding="utf-8"?>
+<p:sld xmlns:a="http://schemas.openxmlformats.org/drawingml/2006/main" xmlns:r="http://schemas.openxmlformats.org/officeDocument/2006/relationships" xmlns:p="http://schemas.openxmlformats.org/presentationml/2006/main" showMasterSp="0">
+  <p:cSld>
+    <p:bg>
+      <p:bgPr>
+        <a:solidFill>
+          <a:schemeClr val="tx2"/>
+        </a:solidFill>
+        <a:effectLst/>
+      </p:bgPr>
+    </p:bg>
+    <p:spTree>
+      <p:nvGrpSpPr>
+        <p:cNvPr id="1" name=""/>
+        <p:cNvGrpSpPr/>
+        <p:nvPr/>
+      </p:nvGrpSpPr>
+      <p:grpSpPr>
+        <a:xfrm>
+          <a:off x="0" y="0"/>
+          <a:ext cx="0" cy="0"/>
+          <a:chOff x="0" y="0"/>
+          <a:chExt cx="0" cy="0"/>
+        </a:xfrm>
+      </p:grpSpPr>
+      <p:pic>
+        <p:nvPicPr>
+          <p:cNvPr id="4" name="Shape 143" descr="logosis1.png"/>
+          <p:cNvPicPr preferRelativeResize="0"/>
+          <p:nvPr/>
+        </p:nvPicPr>
+        <p:blipFill>
+          <a:blip r:embed="rId2">
+            <a:alphaModFix/>
+          </a:blip>
+          <a:stretch>
+            <a:fillRect/>
+          </a:stretch>
+        </p:blipFill>
+        <p:spPr>
+          <a:xfrm>
+            <a:off x="7884368" y="4011910"/>
+            <a:ext cx="1259631" cy="1131590"/>
+          </a:xfrm>
+          <a:prstGeom prst="rect">
+            <a:avLst/>
+          </a:prstGeom>
+          <a:noFill/>
+          <a:ln>
+            <a:noFill/>
+          </a:ln>
+        </p:spPr>
+      </p:pic>
+      <p:sp>
+        <p:nvSpPr>
+          <p:cNvPr id="5" name="4 CuadroTexto"/>
+          <p:cNvSpPr txBox="1"/>
+          <p:nvPr/>
+        </p:nvSpPr>
+        <p:spPr>
+          <a:xfrm>
+            <a:off x="35496" y="125219"/>
+            <a:ext cx="8208912" cy="646331"/>
+          </a:xfrm>
+          <a:prstGeom prst="rect">
+            <a:avLst/>
+          </a:prstGeom>
+          <a:noFill/>
+        </p:spPr>
+        <p:txBody>
+          <a:bodyPr wrap="square" rtlCol="0">
+            <a:spAutoFit/>
+          </a:bodyPr>
+          <a:lstStyle/>
+          <a:p>
+            <a:r>
+              <a:rPr lang="es-CO" sz="3600" b="1" dirty="0">
+                <a:ln w="12700">
+                  <a:solidFill>
+                    <a:schemeClr val="tx2">
+                      <a:satMod val="155000"/>
+                    </a:schemeClr>
+                  </a:solidFill>
+                  <a:prstDash val="solid"/>
+                </a:ln>
+                <a:solidFill>
+                  <a:schemeClr val="tx1"/>
+                </a:solidFill>
+                <a:effectLst>
+                  <a:outerShdw blurRad="41275" dist="20320" dir="1800000" algn="tl" rotWithShape="0">
+                    <a:srgbClr val="000000">
+                      <a:alpha val="40000"/>
+                    </a:srgbClr>
+                  </a:outerShdw>
+                </a:effectLst>
+                <a:latin typeface="Rockwell" panose="02060603020205020403" pitchFamily="18" charset="0"/>
+              </a:rPr>
+              <a:t>Búsqueda Primero en Profundidad</a:t>
+            </a:r>
+          </a:p>
+        </p:txBody>
+      </p:sp>
+      <p:sp>
+        <p:nvSpPr>
+          <p:cNvPr id="7" name="6 CuadroTexto"/>
+          <p:cNvSpPr txBox="1"/>
+          <p:nvPr/>
+        </p:nvSpPr>
+        <p:spPr>
+          <a:xfrm>
+            <a:off x="35497" y="843558"/>
+            <a:ext cx="8640959" cy="461665"/>
+          </a:xfrm>
+          <a:prstGeom prst="rect">
+            <a:avLst/>
+          </a:prstGeom>
+          <a:noFill/>
+        </p:spPr>
+        <p:txBody>
+          <a:bodyPr wrap="square" rtlCol="0">
+            <a:spAutoFit/>
+          </a:bodyPr>
+          <a:lstStyle/>
+          <a:p>
+            <a:r>
+              <a:rPr lang="es-CO" sz="2400" dirty="0" err="1">
+                <a:solidFill>
+                  <a:schemeClr val="accent1">
+                    <a:lumMod val="50000"/>
+                  </a:schemeClr>
+                </a:solidFill>
+                <a:latin typeface="Gabriola" panose="04040605051002020D02" pitchFamily="82" charset="0"/>
+                <a:cs typeface="DaunPenh" panose="01010101010101010101" pitchFamily="2" charset="0"/>
+              </a:rPr>
+              <a:t>Breadth</a:t>
+            </a:r>
+            <a:r>
+              <a:rPr lang="es-CO" sz="2400" dirty="0">
+                <a:solidFill>
+                  <a:schemeClr val="accent1">
+                    <a:lumMod val="50000"/>
+                  </a:schemeClr>
+                </a:solidFill>
+                <a:latin typeface="Gabriola" panose="04040605051002020D02" pitchFamily="82" charset="0"/>
+                <a:cs typeface="DaunPenh" panose="01010101010101010101" pitchFamily="2" charset="0"/>
+              </a:rPr>
+              <a:t> </a:t>
+            </a:r>
+            <a:r>
+              <a:rPr lang="es-CO" sz="2400" dirty="0" err="1">
+                <a:solidFill>
+                  <a:schemeClr val="accent1">
+                    <a:lumMod val="50000"/>
+                  </a:schemeClr>
+                </a:solidFill>
+                <a:latin typeface="Gabriola" panose="04040605051002020D02" pitchFamily="82" charset="0"/>
+                <a:cs typeface="DaunPenh" panose="01010101010101010101" pitchFamily="2" charset="0"/>
+              </a:rPr>
+              <a:t>First</a:t>
+            </a:r>
+            <a:r>
+              <a:rPr lang="es-CO" sz="2400" dirty="0">
+                <a:solidFill>
+                  <a:schemeClr val="accent1">
+                    <a:lumMod val="50000"/>
+                  </a:schemeClr>
+                </a:solidFill>
+                <a:latin typeface="Gabriola" panose="04040605051002020D02" pitchFamily="82" charset="0"/>
+                <a:cs typeface="DaunPenh" panose="01010101010101010101" pitchFamily="2" charset="0"/>
+              </a:rPr>
+              <a:t> </a:t>
+            </a:r>
+            <a:r>
+              <a:rPr lang="es-CO" sz="2400" dirty="0" err="1">
+                <a:solidFill>
+                  <a:schemeClr val="accent1">
+                    <a:lumMod val="50000"/>
+                  </a:schemeClr>
+                </a:solidFill>
+                <a:latin typeface="Gabriola" panose="04040605051002020D02" pitchFamily="82" charset="0"/>
+                <a:cs typeface="DaunPenh" panose="01010101010101010101" pitchFamily="2" charset="0"/>
+              </a:rPr>
+              <a:t>Search</a:t>
+            </a:r>
+            <a:r>
+              <a:rPr lang="es-CO" sz="2400">
+                <a:solidFill>
+                  <a:schemeClr val="accent1">
+                    <a:lumMod val="50000"/>
+                  </a:schemeClr>
+                </a:solidFill>
+                <a:latin typeface="Gabriola" panose="04040605051002020D02" pitchFamily="82" charset="0"/>
+                <a:cs typeface="DaunPenh" panose="01010101010101010101" pitchFamily="2" charset="0"/>
+              </a:rPr>
+              <a:t>….</a:t>
+            </a:r>
+            <a:endParaRPr lang="es-CO" sz="2800" dirty="0">
+              <a:solidFill>
+                <a:srgbClr val="002060"/>
+              </a:solidFill>
+              <a:latin typeface="Gabriola" panose="04040605051002020D02" pitchFamily="82" charset="0"/>
+              <a:cs typeface="DaunPenh" panose="01010101010101010101" pitchFamily="2" charset="0"/>
+            </a:endParaRPr>
+          </a:p>
+        </p:txBody>
+      </p:sp>
+    </p:spTree>
+    <p:extLst>
+      <p:ext uri="{BB962C8B-B14F-4D97-AF65-F5344CB8AC3E}">
+        <p14:creationId xmlns:p14="http://schemas.microsoft.com/office/powerpoint/2010/main" val="1446796842"/>
+      </p:ext>
+    </p:extLst>
+  </p:cSld>
+  <p:clrMapOvr>
+    <a:masterClrMapping/>
+  </p:clrMapOvr>
+</p:sld>
+</file>
+
+<file path=ppt/slides/slide13.xml><?xml version="1.0" encoding="utf-8"?>
+<p:sld xmlns:a="http://schemas.openxmlformats.org/drawingml/2006/main" xmlns:r="http://schemas.openxmlformats.org/officeDocument/2006/relationships" xmlns:p="http://schemas.openxmlformats.org/presentationml/2006/main">
+  <p:cSld>
+    <p:spTree>
+      <p:nvGrpSpPr>
+        <p:cNvPr id="1" name=""/>
+        <p:cNvGrpSpPr/>
+        <p:nvPr/>
+      </p:nvGrpSpPr>
+      <p:grpSpPr>
+        <a:xfrm>
+          <a:off x="0" y="0"/>
+          <a:ext cx="0" cy="0"/>
+          <a:chOff x="0" y="0"/>
+          <a:chExt cx="0" cy="0"/>
+        </a:xfrm>
+      </p:grpSpPr>
+      <p:pic>
+        <p:nvPicPr>
+          <p:cNvPr id="4" name="Shape 143" descr="logosis1.png"/>
+          <p:cNvPicPr preferRelativeResize="0"/>
+          <p:nvPr/>
+        </p:nvPicPr>
+        <p:blipFill>
+          <a:blip r:embed="rId2">
+            <a:alphaModFix/>
+          </a:blip>
+          <a:stretch>
+            <a:fillRect/>
+          </a:stretch>
+        </p:blipFill>
+        <p:spPr>
+          <a:xfrm>
+            <a:off x="6901818" y="3657601"/>
+            <a:ext cx="2242181" cy="1485899"/>
+          </a:xfrm>
+          <a:prstGeom prst="rect">
+            <a:avLst/>
+          </a:prstGeom>
+          <a:noFill/>
+          <a:ln>
+            <a:noFill/>
+          </a:ln>
+        </p:spPr>
+      </p:pic>
+      <p:sp>
+        <p:nvSpPr>
+          <p:cNvPr id="5" name="4 CuadroTexto"/>
+          <p:cNvSpPr txBox="1"/>
+          <p:nvPr/>
+        </p:nvSpPr>
+        <p:spPr>
+          <a:xfrm>
+            <a:off x="107504" y="123478"/>
+            <a:ext cx="7035823" cy="646331"/>
+          </a:xfrm>
+          <a:prstGeom prst="rect">
+            <a:avLst/>
+          </a:prstGeom>
+          <a:noFill/>
+        </p:spPr>
+        <p:txBody>
+          <a:bodyPr wrap="square" rtlCol="0">
+            <a:spAutoFit/>
+          </a:bodyPr>
+          <a:lstStyle/>
+          <a:p>
+            <a:r>
+              <a:rPr lang="es-ES" sz="3600" b="1" dirty="0" err="1">
+                <a:ln w="12700">
+                  <a:solidFill>
+                    <a:schemeClr val="tx2">
+                      <a:satMod val="155000"/>
+                    </a:schemeClr>
+                  </a:solidFill>
+                  <a:prstDash val="solid"/>
+                </a:ln>
+                <a:solidFill>
+                  <a:schemeClr val="tx1"/>
+                </a:solidFill>
+                <a:effectLst>
+                  <a:outerShdw blurRad="41275" dist="20320" dir="1800000" algn="tl" rotWithShape="0">
+                    <a:srgbClr val="000000">
+                      <a:alpha val="40000"/>
+                    </a:srgbClr>
+                  </a:outerShdw>
+                </a:effectLst>
+                <a:latin typeface="Rockwell" panose="02060603020205020403" pitchFamily="18" charset="0"/>
+              </a:rPr>
+              <a:t>lslslslslsls</a:t>
+            </a:r>
+            <a:endParaRPr lang="es-CO" sz="1200" dirty="0">
+              <a:latin typeface="Rockwell" panose="02060603020205020403" pitchFamily="18" charset="0"/>
+            </a:endParaRPr>
+          </a:p>
+        </p:txBody>
+      </p:sp>
+      <p:sp>
+        <p:nvSpPr>
+          <p:cNvPr id="7" name="6 CuadroTexto"/>
+          <p:cNvSpPr txBox="1"/>
+          <p:nvPr/>
+        </p:nvSpPr>
+        <p:spPr>
+          <a:xfrm>
+            <a:off x="215515" y="843558"/>
+            <a:ext cx="8100901" cy="523220"/>
+          </a:xfrm>
+          <a:prstGeom prst="rect">
+            <a:avLst/>
+          </a:prstGeom>
+          <a:noFill/>
+        </p:spPr>
+        <p:txBody>
+          <a:bodyPr wrap="square" rtlCol="0">
+            <a:spAutoFit/>
+          </a:bodyPr>
+          <a:lstStyle/>
+          <a:p>
+            <a:r>
+              <a:rPr lang="es-CO" sz="2800" b="1" dirty="0">
+                <a:solidFill>
+                  <a:srgbClr val="002060"/>
+                </a:solidFill>
+                <a:latin typeface="Gabriola" panose="04040605051002020D02" pitchFamily="82" charset="0"/>
+                <a:cs typeface="DaunPenh" panose="01010101010101010101" pitchFamily="2" charset="0"/>
+              </a:rPr>
+              <a:t>S </a:t>
+            </a:r>
+          </a:p>
+        </p:txBody>
+      </p:sp>
+    </p:spTree>
+    <p:extLst>
+      <p:ext uri="{BB962C8B-B14F-4D97-AF65-F5344CB8AC3E}">
+        <p14:creationId xmlns:p14="http://schemas.microsoft.com/office/powerpoint/2010/main" val="2781779075"/>
       </p:ext>
     </p:extLst>
   </p:cSld>
@@ -17298,7 +18330,7 @@
         </p:nvSpPr>
         <p:spPr>
           <a:xfrm>
-            <a:off x="788855" y="195486"/>
+            <a:off x="683568" y="352276"/>
             <a:ext cx="5076371" cy="923330"/>
           </a:xfrm>
           <a:prstGeom prst="rect">
@@ -17332,7 +18364,7 @@
                     </a:srgbClr>
                   </a:outerShdw>
                 </a:effectLst>
-                <a:latin typeface="Cataneo BT" panose="03020802040502060804" pitchFamily="66" charset="0"/>
+                <a:latin typeface="Rockwell" panose="02060603020205020403" pitchFamily="18" charset="0"/>
               </a:rPr>
               <a:t>Qué es un Grafo? </a:t>
             </a:r>
@@ -17375,55 +18407,7 @@
                 <a:latin typeface="Gabriola" panose="04040605051002020D02" pitchFamily="82" charset="0"/>
                 <a:cs typeface="Arabic Typesetting" panose="03020402040406030203" pitchFamily="66" charset="-78"/>
               </a:rPr>
-              <a:t>U</a:t>
-            </a:r>
-            <a:r>
-              <a:rPr lang="es-CO" sz="2800" b="1" dirty="0" smtClean="0">
-                <a:solidFill>
-                  <a:schemeClr val="accent2">
-                    <a:lumMod val="50000"/>
-                  </a:schemeClr>
-                </a:solidFill>
-                <a:latin typeface="Gabriola" panose="04040605051002020D02" pitchFamily="82" charset="0"/>
-                <a:cs typeface="Arabic Typesetting" panose="03020402040406030203" pitchFamily="66" charset="-78"/>
-              </a:rPr>
-              <a:t>n </a:t>
-            </a:r>
-            <a:r>
-              <a:rPr lang="es-CO" sz="2800" b="1" dirty="0">
-                <a:solidFill>
-                  <a:schemeClr val="accent2">
-                    <a:lumMod val="50000"/>
-                  </a:schemeClr>
-                </a:solidFill>
-                <a:latin typeface="Gabriola" panose="04040605051002020D02" pitchFamily="82" charset="0"/>
-                <a:cs typeface="Arabic Typesetting" panose="03020402040406030203" pitchFamily="66" charset="-78"/>
-              </a:rPr>
-              <a:t>grafo </a:t>
-            </a:r>
-            <a:r>
-              <a:rPr lang="es-CO" sz="2800" b="1" dirty="0" smtClean="0">
-                <a:solidFill>
-                  <a:schemeClr val="accent2">
-                    <a:lumMod val="50000"/>
-                  </a:schemeClr>
-                </a:solidFill>
-                <a:latin typeface="Gabriola" panose="04040605051002020D02" pitchFamily="82" charset="0"/>
-                <a:cs typeface="Arabic Typesetting" panose="03020402040406030203" pitchFamily="66" charset="-78"/>
-              </a:rPr>
-              <a:t>G es </a:t>
-            </a:r>
-            <a:r>
-              <a:rPr lang="es-CO" sz="2800" b="1" dirty="0">
-                <a:solidFill>
-                  <a:schemeClr val="accent2">
-                    <a:lumMod val="50000"/>
-                  </a:schemeClr>
-                </a:solidFill>
-                <a:latin typeface="Gabriola" panose="04040605051002020D02" pitchFamily="82" charset="0"/>
-                <a:cs typeface="Arabic Typesetting" panose="03020402040406030203" pitchFamily="66" charset="-78"/>
-              </a:rPr>
-              <a:t>un conjunto de objetos llamados </a:t>
+              <a:t>Un grafo G es un conjunto de objetos llamados </a:t>
             </a:r>
             <a:r>
               <a:rPr lang="es-CO" sz="2800" b="1" dirty="0">
@@ -17467,41 +18451,8 @@
                 <a:latin typeface="Gabriola" panose="04040605051002020D02" pitchFamily="82" charset="0"/>
                 <a:cs typeface="Arabic Typesetting" panose="03020402040406030203" pitchFamily="66" charset="-78"/>
               </a:rPr>
-              <a:t>, las cuales permiten representar relaciones </a:t>
+              <a:t>, las cuales permiten representar relaciones binarias entre  ellos.</a:t>
             </a:r>
-            <a:r>
-              <a:rPr lang="es-CO" sz="2800" b="1" dirty="0" smtClean="0">
-                <a:solidFill>
-                  <a:schemeClr val="accent2">
-                    <a:lumMod val="50000"/>
-                  </a:schemeClr>
-                </a:solidFill>
-                <a:latin typeface="Gabriola" panose="04040605051002020D02" pitchFamily="82" charset="0"/>
-                <a:cs typeface="Arabic Typesetting" panose="03020402040406030203" pitchFamily="66" charset="-78"/>
-              </a:rPr>
-              <a:t>binarias entre  ellos</a:t>
-            </a:r>
-            <a:r>
-              <a:rPr lang="es-CO" sz="2800" b="1" dirty="0">
-                <a:solidFill>
-                  <a:schemeClr val="accent2">
-                    <a:lumMod val="50000"/>
-                  </a:schemeClr>
-                </a:solidFill>
-                <a:latin typeface="Gabriola" panose="04040605051002020D02" pitchFamily="82" charset="0"/>
-                <a:cs typeface="Arabic Typesetting" panose="03020402040406030203" pitchFamily="66" charset="-78"/>
-              </a:rPr>
-              <a:t>.</a:t>
-            </a:r>
-            <a:endParaRPr lang="es-CO" sz="2800" b="1" dirty="0">
-              <a:solidFill>
-                <a:schemeClr val="accent2">
-                  <a:lumMod val="50000"/>
-                </a:schemeClr>
-              </a:solidFill>
-              <a:latin typeface="Gabriola" panose="04040605051002020D02" pitchFamily="82" charset="0"/>
-              <a:cs typeface="Arabic Typesetting" panose="03020402040406030203" pitchFamily="66" charset="-78"/>
-            </a:endParaRPr>
           </a:p>
         </p:txBody>
       </p:sp>
@@ -17558,7 +18509,7 @@
           <a:lstStyle/>
           <a:p>
             <a:r>
-              <a:rPr lang="es-CO" sz="2000" dirty="0" smtClean="0">
+              <a:rPr lang="es-CO" sz="2000" dirty="0">
                 <a:solidFill>
                   <a:schemeClr val="accent2">
                     <a:lumMod val="50000"/>
@@ -17692,55 +18643,10 @@
                     </a:srgbClr>
                   </a:outerShdw>
                 </a:effectLst>
-                <a:latin typeface="Cataneo BT" panose="03020802040502060804" pitchFamily="66" charset="0"/>
+                <a:latin typeface="Rockwell" panose="02060603020205020403" pitchFamily="18" charset="0"/>
               </a:rPr>
-              <a:t>Qué es </a:t>
+              <a:t>Qué es una Arista? </a:t>
             </a:r>
-            <a:r>
-              <a:rPr lang="es-ES" sz="4000" b="1" dirty="0" smtClean="0">
-                <a:ln w="12700">
-                  <a:solidFill>
-                    <a:schemeClr val="tx2">
-                      <a:satMod val="155000"/>
-                    </a:schemeClr>
-                  </a:solidFill>
-                  <a:prstDash val="solid"/>
-                </a:ln>
-                <a:solidFill>
-                  <a:schemeClr val="tx1"/>
-                </a:solidFill>
-                <a:effectLst>
-                  <a:outerShdw blurRad="41275" dist="20320" dir="1800000" algn="tl" rotWithShape="0">
-                    <a:srgbClr val="000000">
-                      <a:alpha val="40000"/>
-                    </a:srgbClr>
-                  </a:outerShdw>
-                </a:effectLst>
-                <a:latin typeface="Cataneo BT" panose="03020802040502060804" pitchFamily="66" charset="0"/>
-              </a:rPr>
-              <a:t>una Arista? </a:t>
-            </a:r>
-            <a:endParaRPr lang="es-ES" sz="4000" b="1" dirty="0">
-              <a:ln w="12700">
-                <a:solidFill>
-                  <a:schemeClr val="tx2">
-                    <a:satMod val="155000"/>
-                  </a:schemeClr>
-                </a:solidFill>
-                <a:prstDash val="solid"/>
-              </a:ln>
-              <a:solidFill>
-                <a:schemeClr val="tx1"/>
-              </a:solidFill>
-              <a:effectLst>
-                <a:outerShdw blurRad="41275" dist="20320" dir="1800000" algn="tl" rotWithShape="0">
-                  <a:srgbClr val="000000">
-                    <a:alpha val="40000"/>
-                  </a:srgbClr>
-                </a:outerShdw>
-              </a:effectLst>
-              <a:latin typeface="Cataneo BT" panose="03020802040502060804" pitchFamily="66" charset="0"/>
-            </a:endParaRPr>
           </a:p>
           <a:p>
             <a:endParaRPr lang="es-CO" dirty="0"/>
@@ -17774,7 +18680,7 @@
                 <a:solidFill>
                   <a:srgbClr val="002060"/>
                 </a:solidFill>
-                <a:latin typeface="DaunPenh" panose="01010101010101010101" pitchFamily="2" charset="0"/>
+                <a:latin typeface="Gabriola" panose="04040605051002020D02" pitchFamily="82" charset="0"/>
                 <a:cs typeface="DaunPenh" panose="01010101010101010101" pitchFamily="2" charset="0"/>
               </a:rPr>
               <a:t>En teoría de grafos, una</a:t>
@@ -17786,7 +18692,7 @@
                     <a:lumMod val="50000"/>
                   </a:schemeClr>
                 </a:solidFill>
-                <a:latin typeface="DaunPenh" panose="01010101010101010101" pitchFamily="2" charset="0"/>
+                <a:latin typeface="Gabriola" panose="04040605051002020D02" pitchFamily="82" charset="0"/>
                 <a:cs typeface="DaunPenh" panose="01010101010101010101" pitchFamily="2" charset="0"/>
               </a:rPr>
               <a:t> </a:t>
@@ -17796,7 +18702,7 @@
                 <a:solidFill>
                   <a:srgbClr val="0070C0"/>
                 </a:solidFill>
-                <a:latin typeface="DaunPenh" panose="01010101010101010101" pitchFamily="2" charset="0"/>
+                <a:latin typeface="Gabriola" panose="04040605051002020D02" pitchFamily="82" charset="0"/>
                 <a:cs typeface="DaunPenh" panose="01010101010101010101" pitchFamily="2" charset="0"/>
               </a:rPr>
               <a:t>arista </a:t>
@@ -17806,7 +18712,7 @@
                 <a:solidFill>
                   <a:srgbClr val="002060"/>
                 </a:solidFill>
-                <a:latin typeface="DaunPenh" panose="01010101010101010101" pitchFamily="2" charset="0"/>
+                <a:latin typeface="Gabriola" panose="04040605051002020D02" pitchFamily="82" charset="0"/>
                 <a:cs typeface="DaunPenh" panose="01010101010101010101" pitchFamily="2" charset="0"/>
               </a:rPr>
               <a:t>corresponde a una relación entre dos </a:t>
@@ -17816,7 +18722,7 @@
                 <a:solidFill>
                   <a:srgbClr val="0070C0"/>
                 </a:solidFill>
-                <a:latin typeface="DaunPenh" panose="01010101010101010101" pitchFamily="2" charset="0"/>
+                <a:latin typeface="Gabriola" panose="04040605051002020D02" pitchFamily="82" charset="0"/>
                 <a:cs typeface="DaunPenh" panose="01010101010101010101" pitchFamily="2" charset="0"/>
               </a:rPr>
               <a:t>vértices </a:t>
@@ -17826,7 +18732,7 @@
                 <a:solidFill>
                   <a:srgbClr val="002060"/>
                 </a:solidFill>
-                <a:latin typeface="DaunPenh" panose="01010101010101010101" pitchFamily="2" charset="0"/>
+                <a:latin typeface="Gabriola" panose="04040605051002020D02" pitchFamily="82" charset="0"/>
                 <a:cs typeface="DaunPenh" panose="01010101010101010101" pitchFamily="2" charset="0"/>
               </a:rPr>
               <a:t>o </a:t>
@@ -17836,7 +18742,7 @@
                 <a:solidFill>
                   <a:srgbClr val="0070C0"/>
                 </a:solidFill>
-                <a:latin typeface="DaunPenh" panose="01010101010101010101" pitchFamily="2" charset="0"/>
+                <a:latin typeface="Gabriola" panose="04040605051002020D02" pitchFamily="82" charset="0"/>
                 <a:cs typeface="DaunPenh" panose="01010101010101010101" pitchFamily="2" charset="0"/>
               </a:rPr>
               <a:t>nodos </a:t>
@@ -17846,7 +18752,7 @@
                 <a:solidFill>
                   <a:srgbClr val="002060"/>
                 </a:solidFill>
-                <a:latin typeface="DaunPenh" panose="01010101010101010101" pitchFamily="2" charset="0"/>
+                <a:latin typeface="Gabriola" panose="04040605051002020D02" pitchFamily="82" charset="0"/>
                 <a:cs typeface="DaunPenh" panose="01010101010101010101" pitchFamily="2" charset="0"/>
               </a:rPr>
               <a:t>de un grafo.</a:t>
@@ -17858,37 +18764,17 @@
                 <a:solidFill>
                   <a:srgbClr val="002060"/>
                 </a:solidFill>
-                <a:latin typeface="DaunPenh" panose="01010101010101010101" pitchFamily="2" charset="0"/>
+                <a:latin typeface="Gabriola" panose="04040605051002020D02" pitchFamily="82" charset="0"/>
                 <a:cs typeface="DaunPenh" panose="01010101010101010101" pitchFamily="2" charset="0"/>
               </a:rPr>
-              <a:t>Para caracterizar un grafo G son suficientes únicamente el conjunto de todas sus aristas, comúnmente denotado con la letra E (</a:t>
-            </a:r>
-            <a:r>
-              <a:rPr lang="es-CO" sz="2800" b="1" dirty="0" smtClean="0">
-                <a:solidFill>
-                  <a:srgbClr val="002060"/>
-                </a:solidFill>
-                <a:latin typeface="DaunPenh" panose="01010101010101010101" pitchFamily="2" charset="0"/>
-                <a:cs typeface="DaunPenh" panose="01010101010101010101" pitchFamily="2" charset="0"/>
-              </a:rPr>
-              <a:t>Edge), </a:t>
+              <a:t>Para caracterizar un grafo G son suficientes únicamente el conjunto de todas sus aristas, comúnmente denotado con la letra E (Edge), junto con el conjunto de sus </a:t>
             </a:r>
             <a:r>
               <a:rPr lang="es-CO" sz="2800" b="1" dirty="0">
                 <a:solidFill>
-                  <a:srgbClr val="002060"/>
-                </a:solidFill>
-                <a:latin typeface="DaunPenh" panose="01010101010101010101" pitchFamily="2" charset="0"/>
-                <a:cs typeface="DaunPenh" panose="01010101010101010101" pitchFamily="2" charset="0"/>
-              </a:rPr>
-              <a:t>junto con el conjunto de sus </a:t>
-            </a:r>
-            <a:r>
-              <a:rPr lang="es-CO" sz="2800" b="1" dirty="0">
-                <a:solidFill>
                   <a:srgbClr val="0070C0"/>
                 </a:solidFill>
-                <a:latin typeface="DaunPenh" panose="01010101010101010101" pitchFamily="2" charset="0"/>
+                <a:latin typeface="Gabriola" panose="04040605051002020D02" pitchFamily="82" charset="0"/>
                 <a:cs typeface="DaunPenh" panose="01010101010101010101" pitchFamily="2" charset="0"/>
               </a:rPr>
               <a:t>vértices</a:t>
@@ -17898,7 +18784,7 @@
                 <a:solidFill>
                   <a:srgbClr val="002060"/>
                 </a:solidFill>
-                <a:latin typeface="DaunPenh" panose="01010101010101010101" pitchFamily="2" charset="0"/>
+                <a:latin typeface="Gabriola" panose="04040605051002020D02" pitchFamily="82" charset="0"/>
                 <a:cs typeface="DaunPenh" panose="01010101010101010101" pitchFamily="2" charset="0"/>
               </a:rPr>
               <a:t> o</a:t>
@@ -17908,7 +18794,7 @@
                 <a:solidFill>
                   <a:srgbClr val="0070C0"/>
                 </a:solidFill>
-                <a:latin typeface="DaunPenh" panose="01010101010101010101" pitchFamily="2" charset="0"/>
+                <a:latin typeface="Gabriola" panose="04040605051002020D02" pitchFamily="82" charset="0"/>
                 <a:cs typeface="DaunPenh" panose="01010101010101010101" pitchFamily="2" charset="0"/>
               </a:rPr>
               <a:t> nodos</a:t>
@@ -17918,57 +18804,23 @@
                 <a:solidFill>
                   <a:srgbClr val="002060"/>
                 </a:solidFill>
-                <a:latin typeface="DaunPenh" panose="01010101010101010101" pitchFamily="2" charset="0"/>
+                <a:latin typeface="Gabriola" panose="04040605051002020D02" pitchFamily="82" charset="0"/>
                 <a:cs typeface="DaunPenh" panose="01010101010101010101" pitchFamily="2" charset="0"/>
               </a:rPr>
               <a:t>, denotado por V. Así, dicho grafo se puede representar como </a:t>
             </a:r>
-            <a:endParaRPr lang="es-CO" sz="2800" b="1" dirty="0" smtClean="0">
-              <a:solidFill>
-                <a:srgbClr val="002060"/>
-              </a:solidFill>
-              <a:latin typeface="DaunPenh" panose="01010101010101010101" pitchFamily="2" charset="0"/>
-              <a:cs typeface="DaunPenh" panose="01010101010101010101" pitchFamily="2" charset="0"/>
-            </a:endParaRPr>
           </a:p>
           <a:p>
             <a:r>
-              <a:rPr lang="es-CO" sz="2800" b="1" dirty="0" smtClean="0">
+              <a:rPr lang="es-CO" sz="2800" b="1" dirty="0">
                 <a:solidFill>
                   <a:srgbClr val="002060"/>
                 </a:solidFill>
-                <a:latin typeface="DaunPenh" panose="01010101010101010101" pitchFamily="2" charset="0"/>
+                <a:latin typeface="Gabriola" panose="04040605051002020D02" pitchFamily="82" charset="0"/>
                 <a:cs typeface="DaunPenh" panose="01010101010101010101" pitchFamily="2" charset="0"/>
               </a:rPr>
-              <a:t>G </a:t>
+              <a:t>G = (V,E)</a:t>
             </a:r>
-            <a:r>
-              <a:rPr lang="es-CO" sz="2800" b="1" dirty="0">
-                <a:solidFill>
-                  <a:srgbClr val="002060"/>
-                </a:solidFill>
-                <a:latin typeface="DaunPenh" panose="01010101010101010101" pitchFamily="2" charset="0"/>
-                <a:cs typeface="DaunPenh" panose="01010101010101010101" pitchFamily="2" charset="0"/>
-              </a:rPr>
-              <a:t>= (V,E</a:t>
-            </a:r>
-            <a:r>
-              <a:rPr lang="es-CO" sz="2800" b="1" dirty="0" smtClean="0">
-                <a:solidFill>
-                  <a:srgbClr val="002060"/>
-                </a:solidFill>
-                <a:latin typeface="DaunPenh" panose="01010101010101010101" pitchFamily="2" charset="0"/>
-                <a:cs typeface="DaunPenh" panose="01010101010101010101" pitchFamily="2" charset="0"/>
-              </a:rPr>
-              <a:t>)</a:t>
-            </a:r>
-            <a:endParaRPr lang="es-CO" sz="2800" b="1" dirty="0">
-              <a:solidFill>
-                <a:srgbClr val="002060"/>
-              </a:solidFill>
-              <a:latin typeface="DaunPenh" panose="01010101010101010101" pitchFamily="2" charset="0"/>
-              <a:cs typeface="DaunPenh" panose="01010101010101010101" pitchFamily="2" charset="0"/>
-            </a:endParaRPr>
           </a:p>
         </p:txBody>
       </p:sp>
@@ -18038,8 +18890,8 @@
         </p:nvSpPr>
         <p:spPr>
           <a:xfrm>
-            <a:off x="251520" y="237258"/>
-            <a:ext cx="5472608" cy="923330"/>
+            <a:off x="251520" y="280268"/>
+            <a:ext cx="6840760" cy="923330"/>
           </a:xfrm>
           <a:prstGeom prst="rect">
             <a:avLst/>
@@ -18072,33 +18924,9 @@
                     </a:srgbClr>
                   </a:outerShdw>
                 </a:effectLst>
-                <a:latin typeface="Cataneo BT" panose="03020802040502060804" pitchFamily="66" charset="0"/>
+                <a:latin typeface="Rockwell" panose="02060603020205020403" pitchFamily="18" charset="0"/>
               </a:rPr>
-              <a:t>Qué es </a:t>
-            </a:r>
-            <a:r>
-              <a:rPr lang="es-ES" sz="4000" b="1" dirty="0" smtClean="0">
-                <a:ln w="12700">
-                  <a:solidFill>
-                    <a:schemeClr val="tx2">
-                      <a:satMod val="155000"/>
-                    </a:schemeClr>
-                  </a:solidFill>
-                  <a:prstDash val="solid"/>
-                </a:ln>
-                <a:solidFill>
-                  <a:schemeClr val="tx1"/>
-                </a:solidFill>
-                <a:effectLst>
-                  <a:outerShdw blurRad="41275" dist="20320" dir="1800000" algn="tl" rotWithShape="0">
-                    <a:srgbClr val="000000">
-                      <a:alpha val="40000"/>
-                    </a:srgbClr>
-                  </a:outerShdw>
-                </a:effectLst>
-                <a:latin typeface="Cataneo BT" panose="03020802040502060804" pitchFamily="66" charset="0"/>
-              </a:rPr>
-              <a:t>un </a:t>
+              <a:t>Qué es un Nodo o Vértice?</a:t>
             </a:r>
             <a:r>
               <a:rPr lang="es-ES" sz="4000" b="1" dirty="0">
@@ -18122,53 +18950,8 @@
                 </a:effectLst>
                 <a:latin typeface="Cataneo BT" panose="03020802040502060804" pitchFamily="66" charset="0"/>
               </a:rPr>
-              <a:t>N</a:t>
+              <a:t> </a:t>
             </a:r>
-            <a:r>
-              <a:rPr lang="es-ES" sz="4000" b="1" dirty="0" smtClean="0">
-                <a:ln w="12700">
-                  <a:solidFill>
-                    <a:schemeClr val="tx2">
-                      <a:satMod val="155000"/>
-                    </a:schemeClr>
-                  </a:solidFill>
-                  <a:prstDash val="solid"/>
-                </a:ln>
-                <a:solidFill>
-                  <a:schemeClr val="tx1"/>
-                </a:solidFill>
-                <a:effectLst>
-                  <a:outerShdw blurRad="41275" dist="20320" dir="1800000" algn="tl" rotWithShape="0">
-                    <a:srgbClr val="000000">
-                      <a:alpha val="40000"/>
-                    </a:srgbClr>
-                  </a:outerShdw>
-                </a:effectLst>
-                <a:latin typeface="Cataneo BT" panose="03020802040502060804" pitchFamily="66" charset="0"/>
-              </a:rPr>
-              <a:t>odo o Vértice? </a:t>
-            </a:r>
-            <a:endParaRPr lang="es-ES" sz="4000" b="1" dirty="0">
-              <a:ln w="12700">
-                <a:solidFill>
-                  <a:schemeClr val="tx2">
-                    <a:satMod val="155000"/>
-                  </a:schemeClr>
-                </a:solidFill>
-                <a:prstDash val="solid"/>
-              </a:ln>
-              <a:solidFill>
-                <a:schemeClr val="tx1"/>
-              </a:solidFill>
-              <a:effectLst>
-                <a:outerShdw blurRad="41275" dist="20320" dir="1800000" algn="tl" rotWithShape="0">
-                  <a:srgbClr val="000000">
-                    <a:alpha val="40000"/>
-                  </a:srgbClr>
-                </a:outerShdw>
-              </a:effectLst>
-              <a:latin typeface="Cataneo BT" panose="03020802040502060804" pitchFamily="66" charset="0"/>
-            </a:endParaRPr>
           </a:p>
           <a:p>
             <a:endParaRPr lang="es-CO" dirty="0"/>
@@ -18198,42 +18981,35 @@
           <a:lstStyle/>
           <a:p>
             <a:r>
-              <a:rPr lang="es-CO" sz="2800" b="1" dirty="0" smtClean="0">
+              <a:rPr lang="es-CO" sz="2800" b="1" dirty="0">
                 <a:solidFill>
                   <a:srgbClr val="002060"/>
                 </a:solidFill>
-                <a:latin typeface="DaunPenh" panose="01010101010101010101" pitchFamily="2" charset="0"/>
+                <a:latin typeface="Gabriola" panose="04040605051002020D02" pitchFamily="82" charset="0"/>
                 <a:cs typeface="DaunPenh" panose="01010101010101010101" pitchFamily="2" charset="0"/>
               </a:rPr>
               <a:t>Los </a:t>
             </a:r>
             <a:r>
-              <a:rPr lang="es-CO" sz="2800" b="1" dirty="0" smtClean="0">
+              <a:rPr lang="es-CO" sz="2800" b="1" dirty="0">
                 <a:solidFill>
                   <a:srgbClr val="0070C0"/>
                 </a:solidFill>
-                <a:latin typeface="DaunPenh" panose="01010101010101010101" pitchFamily="2" charset="0"/>
+                <a:latin typeface="Gabriola" panose="04040605051002020D02" pitchFamily="82" charset="0"/>
                 <a:cs typeface="DaunPenh" panose="01010101010101010101" pitchFamily="2" charset="0"/>
               </a:rPr>
               <a:t>nodos o vértices </a:t>
             </a:r>
             <a:r>
-              <a:rPr lang="es-CO" sz="2800" b="1" dirty="0" smtClean="0">
+              <a:rPr lang="es-CO" sz="2800" b="1" dirty="0">
                 <a:solidFill>
                   <a:srgbClr val="002060"/>
                 </a:solidFill>
-                <a:latin typeface="DaunPenh" panose="01010101010101010101" pitchFamily="2" charset="0"/>
+                <a:latin typeface="Gabriola" panose="04040605051002020D02" pitchFamily="82" charset="0"/>
                 <a:cs typeface="DaunPenh" panose="01010101010101010101" pitchFamily="2" charset="0"/>
               </a:rPr>
               <a:t>pertenecen a un conjunto finito, y son la unidad fundamental por la que están formados los grafos. De forma general, cada nodo se convierte en el identificador del problema a modelar.</a:t>
             </a:r>
-            <a:endParaRPr lang="es-CO" sz="2800" b="1" dirty="0">
-              <a:solidFill>
-                <a:srgbClr val="002060"/>
-              </a:solidFill>
-              <a:latin typeface="DaunPenh" panose="01010101010101010101" pitchFamily="2" charset="0"/>
-              <a:cs typeface="DaunPenh" panose="01010101010101010101" pitchFamily="2" charset="0"/>
-            </a:endParaRPr>
           </a:p>
         </p:txBody>
       </p:sp>
@@ -18353,7 +19129,7 @@
                 <a:solidFill>
                   <a:srgbClr val="002060"/>
                 </a:solidFill>
-                <a:latin typeface="DaunPenh" panose="01010101010101010101" pitchFamily="2" charset="0"/>
+                <a:latin typeface="Gabriola" panose="04040605051002020D02" pitchFamily="82" charset="0"/>
                 <a:cs typeface="DaunPenh" panose="01010101010101010101" pitchFamily="2" charset="0"/>
               </a:rPr>
               <a:t>En un </a:t>
@@ -18363,7 +19139,7 @@
                 <a:solidFill>
                   <a:srgbClr val="0070C0"/>
                 </a:solidFill>
-                <a:latin typeface="DaunPenh" panose="01010101010101010101" pitchFamily="2" charset="0"/>
+                <a:latin typeface="Gabriola" panose="04040605051002020D02" pitchFamily="82" charset="0"/>
                 <a:cs typeface="DaunPenh" panose="01010101010101010101" pitchFamily="2" charset="0"/>
               </a:rPr>
               <a:t>grado dirigido </a:t>
@@ -18373,50 +19149,40 @@
                 <a:solidFill>
                   <a:srgbClr val="002060"/>
                 </a:solidFill>
-                <a:latin typeface="DaunPenh" panose="01010101010101010101" pitchFamily="2" charset="0"/>
+                <a:latin typeface="Gabriola" panose="04040605051002020D02" pitchFamily="82" charset="0"/>
                 <a:cs typeface="DaunPenh" panose="01010101010101010101" pitchFamily="2" charset="0"/>
               </a:rPr>
-              <a:t>la arista se representa como una flecha, que parte del nodo origen y apunta al nodo destino</a:t>
-            </a:r>
-            <a:r>
-              <a:rPr lang="es-CO" sz="2800" b="1" dirty="0" smtClean="0">
-                <a:solidFill>
-                  <a:srgbClr val="002060"/>
-                </a:solidFill>
-                <a:latin typeface="DaunPenh" panose="01010101010101010101" pitchFamily="2" charset="0"/>
-                <a:cs typeface="DaunPenh" panose="01010101010101010101" pitchFamily="2" charset="0"/>
-              </a:rPr>
-              <a:t>.</a:t>
+              <a:t>la arista se representa como una flecha, que parte del nodo origen y apunta al nodo destino.</a:t>
             </a:r>
           </a:p>
           <a:p>
             <a:pPr algn="just"/>
             <a:r>
-              <a:rPr lang="es-CO" sz="2800" b="1" dirty="0" smtClean="0">
+              <a:rPr lang="es-CO" sz="2800" b="1" dirty="0">
                 <a:solidFill>
                   <a:srgbClr val="002060"/>
                 </a:solidFill>
-                <a:latin typeface="DaunPenh" panose="01010101010101010101" pitchFamily="2" charset="0"/>
+                <a:latin typeface="Gabriola" panose="04040605051002020D02" pitchFamily="82" charset="0"/>
                 <a:cs typeface="DaunPenh" panose="01010101010101010101" pitchFamily="2" charset="0"/>
               </a:rPr>
               <a:t>En un </a:t>
             </a:r>
             <a:r>
-              <a:rPr lang="es-CO" sz="2800" b="1" dirty="0" smtClean="0">
+              <a:rPr lang="es-CO" sz="2800" b="1" dirty="0">
                 <a:solidFill>
                   <a:srgbClr val="0070C0"/>
                 </a:solidFill>
-                <a:latin typeface="DaunPenh" panose="01010101010101010101" pitchFamily="2" charset="0"/>
+                <a:latin typeface="Gabriola" panose="04040605051002020D02" pitchFamily="82" charset="0"/>
                 <a:cs typeface="DaunPenh" panose="01010101010101010101" pitchFamily="2" charset="0"/>
               </a:rPr>
               <a:t>grafo NO dirigido </a:t>
             </a:r>
             <a:r>
-              <a:rPr lang="es-CO" sz="2800" b="1" dirty="0" smtClean="0">
+              <a:rPr lang="es-CO" sz="2800" b="1" dirty="0">
                 <a:solidFill>
                   <a:srgbClr val="002060"/>
                 </a:solidFill>
-                <a:latin typeface="DaunPenh" panose="01010101010101010101" pitchFamily="2" charset="0"/>
+                <a:latin typeface="Gabriola" panose="04040605051002020D02" pitchFamily="82" charset="0"/>
                 <a:cs typeface="DaunPenh" panose="01010101010101010101" pitchFamily="2" charset="0"/>
               </a:rPr>
               <a:t>la representación de la arista es una línea que une dos nodos.</a:t>
@@ -18432,8 +19198,8 @@
         </p:nvSpPr>
         <p:spPr>
           <a:xfrm>
-            <a:off x="251520" y="123478"/>
-            <a:ext cx="7035823" cy="923330"/>
+            <a:off x="35496" y="123478"/>
+            <a:ext cx="8640960" cy="923330"/>
           </a:xfrm>
           <a:prstGeom prst="rect">
             <a:avLst/>
@@ -18447,7 +19213,7 @@
           <a:lstStyle/>
           <a:p>
             <a:r>
-              <a:rPr lang="es-ES" sz="4000" b="1" dirty="0" smtClean="0">
+              <a:rPr lang="es-ES" sz="4000" b="1" dirty="0">
                 <a:ln w="12700">
                   <a:solidFill>
                     <a:schemeClr val="tx2">
@@ -18466,31 +19232,10 @@
                     </a:srgbClr>
                   </a:outerShdw>
                 </a:effectLst>
-                <a:latin typeface="Cataneo BT" panose="03020802040502060804" pitchFamily="66" charset="0"/>
+                <a:latin typeface="Rockwell" panose="02060603020205020403" pitchFamily="18" charset="0"/>
               </a:rPr>
               <a:t>Grafos Dirigidos y No Dirigidos</a:t>
             </a:r>
-            <a:endParaRPr lang="es-ES" sz="4000" b="1" dirty="0">
-              <a:ln w="12700">
-                <a:solidFill>
-                  <a:schemeClr val="tx2">
-                    <a:satMod val="155000"/>
-                  </a:schemeClr>
-                </a:solidFill>
-                <a:prstDash val="solid"/>
-              </a:ln>
-              <a:solidFill>
-                <a:schemeClr val="tx1"/>
-              </a:solidFill>
-              <a:effectLst>
-                <a:outerShdw blurRad="41275" dist="20320" dir="1800000" algn="tl" rotWithShape="0">
-                  <a:srgbClr val="000000">
-                    <a:alpha val="40000"/>
-                  </a:srgbClr>
-                </a:outerShdw>
-              </a:effectLst>
-              <a:latin typeface="Cataneo BT" panose="03020802040502060804" pitchFamily="66" charset="0"/>
-            </a:endParaRPr>
           </a:p>
           <a:p>
             <a:endParaRPr lang="es-CO" dirty="0"/>
@@ -18580,10 +19325,9 @@
           <a:lstStyle/>
           <a:p>
             <a:r>
-              <a:rPr lang="es-CO" b="1" dirty="0" smtClean="0"/>
+              <a:rPr lang="es-CO" b="1" dirty="0"/>
               <a:t>Grafo NO dirigido</a:t>
             </a:r>
-            <a:endParaRPr lang="es-CO" b="1" dirty="0"/>
           </a:p>
         </p:txBody>
       </p:sp>
@@ -18610,10 +19354,9 @@
           <a:lstStyle/>
           <a:p>
             <a:r>
-              <a:rPr lang="es-CO" b="1" dirty="0" smtClean="0"/>
+              <a:rPr lang="es-CO" b="1" dirty="0"/>
               <a:t>Grafo dirigido</a:t>
             </a:r>
-            <a:endParaRPr lang="es-CO" b="1" dirty="0"/>
           </a:p>
         </p:txBody>
       </p:sp>
@@ -18640,7 +19383,7 @@
           <a:lstStyle/>
           <a:p>
             <a:r>
-              <a:rPr lang="es-CO" sz="2800" b="1" dirty="0" smtClean="0">
+              <a:rPr lang="es-CO" sz="2800" b="1" dirty="0">
                 <a:solidFill>
                   <a:srgbClr val="C00000"/>
                 </a:solidFill>
@@ -18648,12 +19391,6 @@
               </a:rPr>
               <a:t>Representación: </a:t>
             </a:r>
-            <a:endParaRPr lang="es-CO" sz="2800" b="1" dirty="0">
-              <a:solidFill>
-                <a:srgbClr val="C00000"/>
-              </a:solidFill>
-              <a:latin typeface="Gabriola" panose="04040605051002020D02" pitchFamily="82" charset="0"/>
-            </a:endParaRPr>
           </a:p>
         </p:txBody>
       </p:sp>
@@ -18723,8 +19460,8 @@
         </p:nvSpPr>
         <p:spPr>
           <a:xfrm>
-            <a:off x="251520" y="172344"/>
-            <a:ext cx="7035823" cy="707886"/>
+            <a:off x="107504" y="172344"/>
+            <a:ext cx="8712968" cy="707886"/>
           </a:xfrm>
           <a:prstGeom prst="rect">
             <a:avLst/>
@@ -18738,7 +19475,7 @@
           <a:lstStyle/>
           <a:p>
             <a:r>
-              <a:rPr lang="es-ES" sz="4000" b="1" dirty="0" smtClean="0">
+              <a:rPr lang="es-ES" sz="4000" b="1" dirty="0">
                 <a:ln w="12700">
                   <a:solidFill>
                     <a:schemeClr val="tx2">
@@ -18757,11 +19494,31 @@
                     </a:srgbClr>
                   </a:outerShdw>
                 </a:effectLst>
-                <a:latin typeface="Cataneo BT" panose="03020802040502060804" pitchFamily="66" charset="0"/>
+                <a:latin typeface="Rockwell" panose="02060603020205020403" pitchFamily="18" charset="0"/>
               </a:rPr>
-              <a:t>Cuáles son los Grafos Dirigidos?</a:t>
+              <a:t>Grafos Dirigidos</a:t>
             </a:r>
-            <a:endParaRPr lang="es-CO" dirty="0"/>
+            <a:endParaRPr lang="es-CO" sz="4000" b="1" dirty="0">
+              <a:ln w="12700">
+                <a:solidFill>
+                  <a:schemeClr val="tx2">
+                    <a:satMod val="155000"/>
+                  </a:schemeClr>
+                </a:solidFill>
+                <a:prstDash val="solid"/>
+              </a:ln>
+              <a:solidFill>
+                <a:schemeClr val="tx1"/>
+              </a:solidFill>
+              <a:effectLst>
+                <a:outerShdw blurRad="41275" dist="20320" dir="1800000" algn="tl" rotWithShape="0">
+                  <a:srgbClr val="000000">
+                    <a:alpha val="40000"/>
+                  </a:srgbClr>
+                </a:outerShdw>
+              </a:effectLst>
+              <a:latin typeface="Rockwell" panose="02060603020205020403" pitchFamily="18" charset="0"/>
+            </a:endParaRPr>
           </a:p>
         </p:txBody>
       </p:sp>
@@ -18773,7 +19530,7 @@
         </p:nvSpPr>
         <p:spPr>
           <a:xfrm>
-            <a:off x="251520" y="1020218"/>
+            <a:off x="251520" y="887189"/>
             <a:ext cx="6840760" cy="1384995"/>
           </a:xfrm>
           <a:prstGeom prst="rect">
@@ -18788,91 +19545,91 @@
           <a:lstStyle/>
           <a:p>
             <a:r>
-              <a:rPr lang="es-CO" sz="2800" b="1" dirty="0" smtClean="0">
+              <a:rPr lang="es-CO" sz="2800" b="1" dirty="0">
                 <a:solidFill>
                   <a:srgbClr val="002060"/>
                 </a:solidFill>
-                <a:latin typeface="DaunPenh" panose="01010101010101010101" pitchFamily="2" charset="0"/>
+                <a:latin typeface="Gabriola" panose="04040605051002020D02" pitchFamily="82" charset="0"/>
                 <a:cs typeface="DaunPenh" panose="01010101010101010101" pitchFamily="2" charset="0"/>
               </a:rPr>
               <a:t>Los </a:t>
             </a:r>
             <a:r>
-              <a:rPr lang="es-CO" sz="2800" b="1" dirty="0" smtClean="0">
+              <a:rPr lang="es-CO" sz="2800" b="1" dirty="0">
                 <a:solidFill>
                   <a:srgbClr val="0070C0"/>
                 </a:solidFill>
-                <a:latin typeface="DaunPenh" panose="01010101010101010101" pitchFamily="2" charset="0"/>
+                <a:latin typeface="Gabriola" panose="04040605051002020D02" pitchFamily="82" charset="0"/>
                 <a:cs typeface="DaunPenh" panose="01010101010101010101" pitchFamily="2" charset="0"/>
               </a:rPr>
               <a:t>grafos dirigidos </a:t>
             </a:r>
             <a:r>
-              <a:rPr lang="es-CO" sz="2800" b="1" dirty="0" smtClean="0">
+              <a:rPr lang="es-CO" sz="2800" b="1" dirty="0">
                 <a:solidFill>
                   <a:srgbClr val="002060"/>
                 </a:solidFill>
-                <a:latin typeface="DaunPenh" panose="01010101010101010101" pitchFamily="2" charset="0"/>
+                <a:latin typeface="Gabriola" panose="04040605051002020D02" pitchFamily="82" charset="0"/>
                 <a:cs typeface="DaunPenh" panose="01010101010101010101" pitchFamily="2" charset="0"/>
               </a:rPr>
               <a:t>son los grafos en los que las </a:t>
             </a:r>
             <a:r>
-              <a:rPr lang="es-CO" sz="2800" b="1" dirty="0" smtClean="0">
+              <a:rPr lang="es-CO" sz="2800" b="1" dirty="0">
                 <a:solidFill>
                   <a:srgbClr val="0070C0"/>
                 </a:solidFill>
-                <a:latin typeface="DaunPenh" panose="01010101010101010101" pitchFamily="2" charset="0"/>
+                <a:latin typeface="Gabriola" panose="04040605051002020D02" pitchFamily="82" charset="0"/>
                 <a:cs typeface="DaunPenh" panose="01010101010101010101" pitchFamily="2" charset="0"/>
               </a:rPr>
               <a:t>aristas</a:t>
             </a:r>
             <a:r>
-              <a:rPr lang="es-CO" sz="2800" b="1" dirty="0" smtClean="0">
+              <a:rPr lang="es-CO" sz="2800" b="1" dirty="0">
                 <a:solidFill>
                   <a:srgbClr val="002060"/>
                 </a:solidFill>
-                <a:latin typeface="DaunPenh" panose="01010101010101010101" pitchFamily="2" charset="0"/>
+                <a:latin typeface="Gabriola" panose="04040605051002020D02" pitchFamily="82" charset="0"/>
                 <a:cs typeface="DaunPenh" panose="01010101010101010101" pitchFamily="2" charset="0"/>
               </a:rPr>
               <a:t> tienen una dirección definida; por ejemplo, se puede dar el caso de poder ir </a:t>
             </a:r>
             <a:r>
-              <a:rPr lang="es-CO" sz="2800" b="1" dirty="0" smtClean="0">
+              <a:rPr lang="es-CO" sz="2800" b="1" dirty="0">
                 <a:solidFill>
                   <a:srgbClr val="0070C0"/>
                 </a:solidFill>
-                <a:latin typeface="DaunPenh" panose="01010101010101010101" pitchFamily="2" charset="0"/>
+                <a:latin typeface="Gabriola" panose="04040605051002020D02" pitchFamily="82" charset="0"/>
                 <a:cs typeface="DaunPenh" panose="01010101010101010101" pitchFamily="2" charset="0"/>
               </a:rPr>
               <a:t>del nodo A al nodo B</a:t>
             </a:r>
             <a:r>
-              <a:rPr lang="es-CO" sz="2800" b="1" dirty="0" smtClean="0">
+              <a:rPr lang="es-CO" sz="2800" b="1" dirty="0">
                 <a:solidFill>
                   <a:srgbClr val="002060"/>
                 </a:solidFill>
-                <a:latin typeface="DaunPenh" panose="01010101010101010101" pitchFamily="2" charset="0"/>
+                <a:latin typeface="Gabriola" panose="04040605051002020D02" pitchFamily="82" charset="0"/>
                 <a:cs typeface="DaunPenh" panose="01010101010101010101" pitchFamily="2" charset="0"/>
               </a:rPr>
               <a:t>, pero </a:t>
             </a:r>
             <a:r>
-              <a:rPr lang="es-CO" sz="2800" b="1" dirty="0" smtClean="0">
+              <a:rPr lang="es-CO" sz="2800" b="1" dirty="0">
                 <a:solidFill>
                   <a:srgbClr val="0070C0"/>
                 </a:solidFill>
-                <a:latin typeface="DaunPenh" panose="01010101010101010101" pitchFamily="2" charset="0"/>
+                <a:latin typeface="Gabriola" panose="04040605051002020D02" pitchFamily="82" charset="0"/>
                 <a:cs typeface="DaunPenh" panose="01010101010101010101" pitchFamily="2" charset="0"/>
               </a:rPr>
               <a:t>no</a:t>
             </a:r>
             <a:r>
-              <a:rPr lang="es-CO" sz="2800" b="1" dirty="0" smtClean="0">
+              <a:rPr lang="es-CO" sz="2800" b="1" dirty="0">
                 <a:solidFill>
                   <a:srgbClr val="002060"/>
                 </a:solidFill>
-                <a:latin typeface="DaunPenh" panose="01010101010101010101" pitchFamily="2" charset="0"/>
+                <a:latin typeface="Gabriola" panose="04040605051002020D02" pitchFamily="82" charset="0"/>
                 <a:cs typeface="DaunPenh" panose="01010101010101010101" pitchFamily="2" charset="0"/>
               </a:rPr>
               <a:t> al revés.</a:t>
@@ -18902,8 +19659,8 @@
         </p:blipFill>
         <p:spPr>
           <a:xfrm>
-            <a:off x="539552" y="2241090"/>
-            <a:ext cx="2202415" cy="2833022"/>
+            <a:off x="539552" y="2314528"/>
+            <a:ext cx="2088232" cy="2686146"/>
           </a:xfrm>
           <a:prstGeom prst="rect">
             <a:avLst/>
@@ -18941,25 +19698,8 @@
                 <a:latin typeface="Bell MT" panose="02020503060305020303" pitchFamily="18" charset="0"/>
                 <a:cs typeface="Aparajita" panose="020B0604020202020204" pitchFamily="34" charset="0"/>
               </a:rPr>
-              <a:t>El conjunto </a:t>
+              <a:t>El conjunto de aristas</a:t>
             </a:r>
-            <a:r>
-              <a:rPr lang="es-CO" sz="1800" b="1" dirty="0" smtClean="0">
-                <a:solidFill>
-                  <a:schemeClr val="tx1"/>
-                </a:solidFill>
-                <a:latin typeface="Bell MT" panose="02020503060305020303" pitchFamily="18" charset="0"/>
-                <a:cs typeface="Aparajita" panose="020B0604020202020204" pitchFamily="34" charset="0"/>
-              </a:rPr>
-              <a:t>de aristas</a:t>
-            </a:r>
-            <a:endParaRPr lang="es-CO" sz="1800" b="1" dirty="0">
-              <a:solidFill>
-                <a:schemeClr val="tx1"/>
-              </a:solidFill>
-              <a:latin typeface="Bell MT" panose="02020503060305020303" pitchFamily="18" charset="0"/>
-              <a:cs typeface="Aparajita" panose="020B0604020202020204" pitchFamily="34" charset="0"/>
-            </a:endParaRPr>
           </a:p>
           <a:p>
             <a:pPr algn="ctr"/>
@@ -18971,65 +19711,8 @@
                 <a:latin typeface="Bell MT" panose="02020503060305020303" pitchFamily="18" charset="0"/>
                 <a:cs typeface="Aparajita" panose="020B0604020202020204" pitchFamily="34" charset="0"/>
               </a:rPr>
-              <a:t>E = { (A,B), (B,A), (B,C), (C,B), </a:t>
+              <a:t>E = { (A,B), (B,A), (B,C), (C,B), (D,C), 	(C,D), (D,A), (E,A) }</a:t>
             </a:r>
-            <a:r>
-              <a:rPr lang="es-CO" sz="1800" dirty="0" smtClean="0">
-                <a:solidFill>
-                  <a:schemeClr val="tx1"/>
-                </a:solidFill>
-                <a:latin typeface="Bell MT" panose="02020503060305020303" pitchFamily="18" charset="0"/>
-                <a:cs typeface="Aparajita" panose="020B0604020202020204" pitchFamily="34" charset="0"/>
-              </a:rPr>
-              <a:t>(</a:t>
-            </a:r>
-            <a:r>
-              <a:rPr lang="es-CO" sz="1800" dirty="0">
-                <a:solidFill>
-                  <a:schemeClr val="tx1"/>
-                </a:solidFill>
-                <a:latin typeface="Bell MT" panose="02020503060305020303" pitchFamily="18" charset="0"/>
-                <a:cs typeface="Aparajita" panose="020B0604020202020204" pitchFamily="34" charset="0"/>
-              </a:rPr>
-              <a:t>D,C), </a:t>
-            </a:r>
-            <a:r>
-              <a:rPr lang="es-CO" sz="1800" dirty="0" smtClean="0">
-                <a:solidFill>
-                  <a:schemeClr val="tx1"/>
-                </a:solidFill>
-                <a:latin typeface="Bell MT" panose="02020503060305020303" pitchFamily="18" charset="0"/>
-                <a:cs typeface="Aparajita" panose="020B0604020202020204" pitchFamily="34" charset="0"/>
-              </a:rPr>
-              <a:t>	(</a:t>
-            </a:r>
-            <a:r>
-              <a:rPr lang="es-CO" sz="1800" dirty="0">
-                <a:solidFill>
-                  <a:schemeClr val="tx1"/>
-                </a:solidFill>
-                <a:latin typeface="Bell MT" panose="02020503060305020303" pitchFamily="18" charset="0"/>
-                <a:cs typeface="Aparajita" panose="020B0604020202020204" pitchFamily="34" charset="0"/>
-              </a:rPr>
-              <a:t>C,D), (D,A), (E,A) </a:t>
-            </a:r>
-            <a:r>
-              <a:rPr lang="es-CO" sz="1800" dirty="0" smtClean="0">
-                <a:solidFill>
-                  <a:schemeClr val="tx1"/>
-                </a:solidFill>
-                <a:latin typeface="Bell MT" panose="02020503060305020303" pitchFamily="18" charset="0"/>
-                <a:cs typeface="Aparajita" panose="020B0604020202020204" pitchFamily="34" charset="0"/>
-              </a:rPr>
-              <a:t>}</a:t>
-            </a:r>
-            <a:endParaRPr lang="es-CO" sz="1800" dirty="0">
-              <a:solidFill>
-                <a:schemeClr val="tx1"/>
-              </a:solidFill>
-              <a:latin typeface="Bell MT" panose="02020503060305020303" pitchFamily="18" charset="0"/>
-              <a:cs typeface="Aparajita" panose="020B0604020202020204" pitchFamily="34" charset="0"/>
-            </a:endParaRPr>
           </a:p>
         </p:txBody>
       </p:sp>
@@ -19100,7 +19783,7 @@
         <p:spPr>
           <a:xfrm>
             <a:off x="179512" y="197227"/>
-            <a:ext cx="7035823" cy="646331"/>
+            <a:ext cx="8712968" cy="615553"/>
           </a:xfrm>
           <a:prstGeom prst="rect">
             <a:avLst/>
@@ -19114,7 +19797,7 @@
           <a:lstStyle/>
           <a:p>
             <a:r>
-              <a:rPr lang="es-ES" sz="3600" b="1" dirty="0" smtClean="0">
+              <a:rPr lang="es-ES" sz="3400" b="1" dirty="0">
                 <a:ln w="12700">
                   <a:solidFill>
                     <a:schemeClr val="tx2">
@@ -19133,11 +19816,10 @@
                     </a:srgbClr>
                   </a:outerShdw>
                 </a:effectLst>
-                <a:latin typeface="Cataneo BT" panose="03020802040502060804" pitchFamily="66" charset="0"/>
+                <a:latin typeface="Rockwell" panose="02060603020205020403" pitchFamily="18" charset="0"/>
               </a:rPr>
-              <a:t>Cuáles son los Grafos NO Dirigidos?</a:t>
+              <a:t>Grafos NO Dirigidos</a:t>
             </a:r>
-            <a:endParaRPr lang="es-CO" sz="1200" dirty="0"/>
           </a:p>
         </p:txBody>
       </p:sp>
@@ -19149,7 +19831,7 @@
         </p:nvSpPr>
         <p:spPr>
           <a:xfrm>
-            <a:off x="251519" y="915566"/>
+            <a:off x="251519" y="843558"/>
             <a:ext cx="6963815" cy="1815882"/>
           </a:xfrm>
           <a:prstGeom prst="rect">
@@ -19164,31 +19846,21 @@
           <a:lstStyle/>
           <a:p>
             <a:r>
-              <a:rPr lang="es-CO" sz="2800" b="1" dirty="0" smtClean="0">
+              <a:rPr lang="es-CO" sz="2800" b="1" dirty="0">
                 <a:solidFill>
                   <a:srgbClr val="002060"/>
                 </a:solidFill>
-                <a:latin typeface="DaunPenh" panose="01010101010101010101" pitchFamily="2" charset="0"/>
+                <a:latin typeface="Gabriola" panose="04040605051002020D02" pitchFamily="82" charset="0"/>
                 <a:cs typeface="DaunPenh" panose="01010101010101010101" pitchFamily="2" charset="0"/>
               </a:rPr>
-              <a:t>Sea </a:t>
+              <a:t>Sea G un </a:t>
             </a:r>
             <a:r>
               <a:rPr lang="es-CO" sz="2800" b="1" dirty="0">
                 <a:solidFill>
-                  <a:srgbClr val="002060"/>
-                </a:solidFill>
-                <a:latin typeface="DaunPenh" panose="01010101010101010101" pitchFamily="2" charset="0"/>
-                <a:cs typeface="DaunPenh" panose="01010101010101010101" pitchFamily="2" charset="0"/>
-              </a:rPr>
-              <a:t>G un </a:t>
-            </a:r>
-            <a:r>
-              <a:rPr lang="es-CO" sz="2800" b="1" dirty="0">
-                <a:solidFill>
                   <a:srgbClr val="0070C0"/>
                 </a:solidFill>
-                <a:latin typeface="DaunPenh" panose="01010101010101010101" pitchFamily="2" charset="0"/>
+                <a:latin typeface="Gabriola" panose="04040605051002020D02" pitchFamily="82" charset="0"/>
                 <a:cs typeface="DaunPenh" panose="01010101010101010101" pitchFamily="2" charset="0"/>
               </a:rPr>
               <a:t>grafo no dirigido </a:t>
@@ -19198,37 +19870,17 @@
                 <a:solidFill>
                   <a:srgbClr val="002060"/>
                 </a:solidFill>
-                <a:latin typeface="DaunPenh" panose="01010101010101010101" pitchFamily="2" charset="0"/>
+                <a:latin typeface="Gabriola" panose="04040605051002020D02" pitchFamily="82" charset="0"/>
                 <a:cs typeface="DaunPenh" panose="01010101010101010101" pitchFamily="2" charset="0"/>
               </a:rPr>
-              <a:t>donde G =(V,E) donde </a:t>
-            </a:r>
-            <a:r>
-              <a:rPr lang="es-CO" sz="2800" b="1" dirty="0" smtClean="0">
-                <a:solidFill>
-                  <a:srgbClr val="002060"/>
-                </a:solidFill>
-                <a:latin typeface="DaunPenh" panose="01010101010101010101" pitchFamily="2" charset="0"/>
-                <a:cs typeface="DaunPenh" panose="01010101010101010101" pitchFamily="2" charset="0"/>
-              </a:rPr>
-              <a:t>V corresponde </a:t>
+              <a:t>donde G =(V,E) donde V corresponde al conjunto de nodos y E el conjunto de aristas del grafo, un grafo </a:t>
             </a:r>
             <a:r>
               <a:rPr lang="es-CO" sz="2800" b="1" dirty="0">
                 <a:solidFill>
-                  <a:srgbClr val="002060"/>
-                </a:solidFill>
-                <a:latin typeface="DaunPenh" panose="01010101010101010101" pitchFamily="2" charset="0"/>
-                <a:cs typeface="DaunPenh" panose="01010101010101010101" pitchFamily="2" charset="0"/>
-              </a:rPr>
-              <a:t>al conjunto de nodos y E el conjunto de aristas del grafo, un grafo </a:t>
-            </a:r>
-            <a:r>
-              <a:rPr lang="es-CO" sz="2800" b="1" dirty="0">
-                <a:solidFill>
                   <a:srgbClr val="0070C0"/>
                 </a:solidFill>
-                <a:latin typeface="DaunPenh" panose="01010101010101010101" pitchFamily="2" charset="0"/>
+                <a:latin typeface="Gabriola" panose="04040605051002020D02" pitchFamily="82" charset="0"/>
                 <a:cs typeface="DaunPenh" panose="01010101010101010101" pitchFamily="2" charset="0"/>
               </a:rPr>
               <a:t>no dirigido </a:t>
@@ -19238,7 +19890,7 @@
                 <a:solidFill>
                   <a:srgbClr val="002060"/>
                 </a:solidFill>
-                <a:latin typeface="DaunPenh" panose="01010101010101010101" pitchFamily="2" charset="0"/>
+                <a:latin typeface="Gabriola" panose="04040605051002020D02" pitchFamily="82" charset="0"/>
                 <a:cs typeface="DaunPenh" panose="01010101010101010101" pitchFamily="2" charset="0"/>
               </a:rPr>
               <a:t>se diferencia de un grafo dirigido porque cada arista en E es un </a:t>
@@ -19248,7 +19900,7 @@
                 <a:solidFill>
                   <a:srgbClr val="0070C0"/>
                 </a:solidFill>
-                <a:latin typeface="DaunPenh" panose="01010101010101010101" pitchFamily="2" charset="0"/>
+                <a:latin typeface="Gabriola" panose="04040605051002020D02" pitchFamily="82" charset="0"/>
                 <a:cs typeface="DaunPenh" panose="01010101010101010101" pitchFamily="2" charset="0"/>
               </a:rPr>
               <a:t>par no ordenado </a:t>
@@ -19258,18 +19910,11 @@
                 <a:solidFill>
                   <a:srgbClr val="002060"/>
                 </a:solidFill>
-                <a:latin typeface="DaunPenh" panose="01010101010101010101" pitchFamily="2" charset="0"/>
+                <a:latin typeface="Gabriola" panose="04040605051002020D02" pitchFamily="82" charset="0"/>
                 <a:cs typeface="DaunPenh" panose="01010101010101010101" pitchFamily="2" charset="0"/>
               </a:rPr>
               <a:t>de nodos.</a:t>
             </a:r>
-            <a:endParaRPr lang="es-CO" sz="2800" b="1" dirty="0">
-              <a:solidFill>
-                <a:srgbClr val="002060"/>
-              </a:solidFill>
-              <a:latin typeface="DaunPenh" panose="01010101010101010101" pitchFamily="2" charset="0"/>
-              <a:cs typeface="DaunPenh" panose="01010101010101010101" pitchFamily="2" charset="0"/>
-            </a:endParaRPr>
           </a:p>
         </p:txBody>
       </p:sp>
@@ -19295,8 +19940,8 @@
         </p:blipFill>
         <p:spPr>
           <a:xfrm>
-            <a:off x="971600" y="2604492"/>
-            <a:ext cx="2300644" cy="2487538"/>
+            <a:off x="899592" y="2715766"/>
+            <a:ext cx="2197730" cy="2376264"/>
           </a:xfrm>
           <a:prstGeom prst="rect">
             <a:avLst/>
@@ -19334,25 +19979,8 @@
                 <a:latin typeface="Bell MT" panose="02020503060305020303" pitchFamily="18" charset="0"/>
                 <a:cs typeface="Aparajita" panose="020B0604020202020204" pitchFamily="34" charset="0"/>
               </a:rPr>
-              <a:t>El conjunto </a:t>
+              <a:t>El conjunto de aristas</a:t>
             </a:r>
-            <a:r>
-              <a:rPr lang="es-CO" sz="1800" b="1" dirty="0" smtClean="0">
-                <a:solidFill>
-                  <a:schemeClr val="tx1"/>
-                </a:solidFill>
-                <a:latin typeface="Bell MT" panose="02020503060305020303" pitchFamily="18" charset="0"/>
-                <a:cs typeface="Aparajita" panose="020B0604020202020204" pitchFamily="34" charset="0"/>
-              </a:rPr>
-              <a:t>de aristas</a:t>
-            </a:r>
-            <a:endParaRPr lang="es-CO" sz="1800" b="1" dirty="0">
-              <a:solidFill>
-                <a:schemeClr val="tx1"/>
-              </a:solidFill>
-              <a:latin typeface="Bell MT" panose="02020503060305020303" pitchFamily="18" charset="0"/>
-              <a:cs typeface="Aparajita" panose="020B0604020202020204" pitchFamily="34" charset="0"/>
-            </a:endParaRPr>
           </a:p>
           <a:p>
             <a:pPr algn="ctr"/>
@@ -19364,105 +19992,8 @@
                 <a:latin typeface="Bell MT" panose="02020503060305020303" pitchFamily="18" charset="0"/>
                 <a:cs typeface="Aparajita" panose="020B0604020202020204" pitchFamily="34" charset="0"/>
               </a:rPr>
-              <a:t>E = { (A,B</a:t>
+              <a:t>E = { (A,B), (B,A), (A,C), (C,A), (A,D),  (D,A), (B,C), (C,B), (B,D), (D,B) }</a:t>
             </a:r>
-            <a:r>
-              <a:rPr lang="es-CO" sz="1800" dirty="0" smtClean="0">
-                <a:solidFill>
-                  <a:schemeClr val="tx1"/>
-                </a:solidFill>
-                <a:latin typeface="Bell MT" panose="02020503060305020303" pitchFamily="18" charset="0"/>
-                <a:cs typeface="Aparajita" panose="020B0604020202020204" pitchFamily="34" charset="0"/>
-              </a:rPr>
-              <a:t>),</a:t>
-            </a:r>
-            <a:r>
-              <a:rPr lang="es-CO" sz="1800" dirty="0">
-                <a:solidFill>
-                  <a:schemeClr val="tx1"/>
-                </a:solidFill>
-                <a:latin typeface="Bell MT" panose="02020503060305020303" pitchFamily="18" charset="0"/>
-                <a:cs typeface="Aparajita" panose="020B0604020202020204" pitchFamily="34" charset="0"/>
-              </a:rPr>
-              <a:t> (B,A),</a:t>
-            </a:r>
-            <a:r>
-              <a:rPr lang="es-CO" sz="1800" dirty="0" smtClean="0">
-                <a:solidFill>
-                  <a:schemeClr val="tx1"/>
-                </a:solidFill>
-                <a:latin typeface="Bell MT" panose="02020503060305020303" pitchFamily="18" charset="0"/>
-                <a:cs typeface="Aparajita" panose="020B0604020202020204" pitchFamily="34" charset="0"/>
-              </a:rPr>
-              <a:t> (A,C),</a:t>
-            </a:r>
-            <a:r>
-              <a:rPr lang="es-CO" sz="1800" dirty="0">
-                <a:solidFill>
-                  <a:schemeClr val="tx1"/>
-                </a:solidFill>
-                <a:latin typeface="Bell MT" panose="02020503060305020303" pitchFamily="18" charset="0"/>
-                <a:cs typeface="Aparajita" panose="020B0604020202020204" pitchFamily="34" charset="0"/>
-              </a:rPr>
-              <a:t> (C,A),</a:t>
-            </a:r>
-            <a:r>
-              <a:rPr lang="es-CO" sz="1800" dirty="0" smtClean="0">
-                <a:solidFill>
-                  <a:schemeClr val="tx1"/>
-                </a:solidFill>
-                <a:latin typeface="Bell MT" panose="02020503060305020303" pitchFamily="18" charset="0"/>
-                <a:cs typeface="Aparajita" panose="020B0604020202020204" pitchFamily="34" charset="0"/>
-              </a:rPr>
-              <a:t> (A,D),  </a:t>
-            </a:r>
-            <a:r>
-              <a:rPr lang="es-CO" sz="1800" dirty="0">
-                <a:solidFill>
-                  <a:schemeClr val="tx1"/>
-                </a:solidFill>
-                <a:latin typeface="Bell MT" panose="02020503060305020303" pitchFamily="18" charset="0"/>
-                <a:cs typeface="Aparajita" panose="020B0604020202020204" pitchFamily="34" charset="0"/>
-              </a:rPr>
-              <a:t>(D,A), </a:t>
-            </a:r>
-            <a:r>
-              <a:rPr lang="es-CO" sz="1800" dirty="0" smtClean="0">
-                <a:solidFill>
-                  <a:schemeClr val="tx1"/>
-                </a:solidFill>
-                <a:latin typeface="Bell MT" panose="02020503060305020303" pitchFamily="18" charset="0"/>
-                <a:cs typeface="Aparajita" panose="020B0604020202020204" pitchFamily="34" charset="0"/>
-              </a:rPr>
-              <a:t>(B,C),</a:t>
-            </a:r>
-            <a:r>
-              <a:rPr lang="es-CO" sz="1800" dirty="0">
-                <a:solidFill>
-                  <a:schemeClr val="tx1"/>
-                </a:solidFill>
-                <a:latin typeface="Bell MT" panose="02020503060305020303" pitchFamily="18" charset="0"/>
-                <a:cs typeface="Aparajita" panose="020B0604020202020204" pitchFamily="34" charset="0"/>
-              </a:rPr>
-              <a:t> (C,B),</a:t>
-            </a:r>
-            <a:r>
-              <a:rPr lang="es-CO" sz="1800" dirty="0" smtClean="0">
-                <a:solidFill>
-                  <a:schemeClr val="tx1"/>
-                </a:solidFill>
-                <a:latin typeface="Bell MT" panose="02020503060305020303" pitchFamily="18" charset="0"/>
-                <a:cs typeface="Aparajita" panose="020B0604020202020204" pitchFamily="34" charset="0"/>
-              </a:rPr>
-              <a:t> (B,D), (D,B) }</a:t>
-            </a:r>
-            <a:endParaRPr lang="es-CO" sz="1800" dirty="0">
-              <a:solidFill>
-                <a:schemeClr val="tx1"/>
-              </a:solidFill>
-              <a:latin typeface="Bell MT" panose="02020503060305020303" pitchFamily="18" charset="0"/>
-              <a:cs typeface="Aparajita" panose="020B0604020202020204" pitchFamily="34" charset="0"/>
-            </a:endParaRPr>
           </a:p>
         </p:txBody>
       </p:sp>
@@ -19496,25 +20027,6 @@
           <a:chExt cx="0" cy="0"/>
         </a:xfrm>
       </p:grpSpPr>
-      <p:sp>
-        <p:nvSpPr>
-          <p:cNvPr id="3" name="2 Marcador de texto"/>
-          <p:cNvSpPr>
-            <a:spLocks noGrp="1"/>
-          </p:cNvSpPr>
-          <p:nvPr>
-            <p:ph type="body" idx="1"/>
-          </p:nvPr>
-        </p:nvSpPr>
-        <p:spPr/>
-        <p:txBody>
-          <a:bodyPr/>
-          <a:lstStyle/>
-          <a:p>
-            <a:endParaRPr lang="es-CO" dirty="0"/>
-          </a:p>
-        </p:txBody>
-      </p:sp>
       <p:pic>
         <p:nvPicPr>
           <p:cNvPr id="4" name="Shape 143" descr="logosis1.png"/>
@@ -19551,7 +20063,7 @@
         </p:nvSpPr>
         <p:spPr>
           <a:xfrm>
-            <a:off x="179512" y="197227"/>
+            <a:off x="179512" y="390018"/>
             <a:ext cx="7035823" cy="646331"/>
           </a:xfrm>
           <a:prstGeom prst="rect">
@@ -19566,7 +20078,7 @@
           <a:lstStyle/>
           <a:p>
             <a:r>
-              <a:rPr lang="es-ES" sz="3600" b="1" dirty="0" smtClean="0">
+              <a:rPr lang="es-ES" sz="3600" b="1" dirty="0">
                 <a:ln w="12700">
                   <a:solidFill>
                     <a:schemeClr val="tx2">
@@ -19585,11 +20097,92 @@
                     </a:srgbClr>
                   </a:outerShdw>
                 </a:effectLst>
-                <a:latin typeface="Cataneo BT" panose="03020802040502060804" pitchFamily="66" charset="0"/>
+                <a:latin typeface="Rockwell" panose="02060603020205020403" pitchFamily="18" charset="0"/>
               </a:rPr>
               <a:t>Formas De Representación</a:t>
             </a:r>
-            <a:endParaRPr lang="es-CO" sz="1200" dirty="0"/>
+            <a:endParaRPr lang="es-CO" sz="1200" dirty="0">
+              <a:latin typeface="Rockwell" panose="02060603020205020403" pitchFamily="18" charset="0"/>
+            </a:endParaRPr>
+          </a:p>
+        </p:txBody>
+      </p:sp>
+      <p:sp>
+        <p:nvSpPr>
+          <p:cNvPr id="6" name="6 CuadroTexto"/>
+          <p:cNvSpPr txBox="1"/>
+          <p:nvPr/>
+        </p:nvSpPr>
+        <p:spPr>
+          <a:xfrm>
+            <a:off x="167851" y="1347614"/>
+            <a:ext cx="6963815" cy="1754326"/>
+          </a:xfrm>
+          <a:prstGeom prst="rect">
+            <a:avLst/>
+          </a:prstGeom>
+          <a:noFill/>
+        </p:spPr>
+        <p:txBody>
+          <a:bodyPr wrap="square" rtlCol="0">
+            <a:spAutoFit/>
+          </a:bodyPr>
+          <a:lstStyle/>
+          <a:p>
+            <a:r>
+              <a:rPr lang="es-CO" sz="3600" b="1" dirty="0">
+                <a:solidFill>
+                  <a:srgbClr val="002060"/>
+                </a:solidFill>
+                <a:latin typeface="Gabriola" panose="04040605051002020D02" pitchFamily="82" charset="0"/>
+                <a:cs typeface="DaunPenh" panose="01010101010101010101" pitchFamily="2" charset="0"/>
+              </a:rPr>
+              <a:t>Existen diferentes implementaciones del tipo grafo: con una </a:t>
+            </a:r>
+            <a:r>
+              <a:rPr lang="es-CO" sz="3600" b="1" dirty="0">
+                <a:solidFill>
+                  <a:schemeClr val="accent1">
+                    <a:lumMod val="50000"/>
+                  </a:schemeClr>
+                </a:solidFill>
+                <a:latin typeface="Gabriola" panose="04040605051002020D02" pitchFamily="82" charset="0"/>
+                <a:cs typeface="DaunPenh" panose="01010101010101010101" pitchFamily="2" charset="0"/>
+              </a:rPr>
+              <a:t>matriz de adyacencias </a:t>
+            </a:r>
+            <a:r>
+              <a:rPr lang="es-CO" sz="3600" b="1" dirty="0">
+                <a:solidFill>
+                  <a:srgbClr val="002060"/>
+                </a:solidFill>
+                <a:latin typeface="Gabriola" panose="04040605051002020D02" pitchFamily="82" charset="0"/>
+                <a:cs typeface="DaunPenh" panose="01010101010101010101" pitchFamily="2" charset="0"/>
+              </a:rPr>
+              <a:t>(forma acotada) y con </a:t>
+            </a:r>
+            <a:r>
+              <a:rPr lang="es-CO" sz="3600" b="1" dirty="0">
+                <a:solidFill>
+                  <a:schemeClr val="accent1">
+                    <a:lumMod val="50000"/>
+                  </a:schemeClr>
+                </a:solidFill>
+                <a:latin typeface="Gabriola" panose="04040605051002020D02" pitchFamily="82" charset="0"/>
+                <a:cs typeface="DaunPenh" panose="01010101010101010101" pitchFamily="2" charset="0"/>
+              </a:rPr>
+              <a:t>listas de adyacencia</a:t>
+            </a:r>
+            <a:r>
+              <a:rPr lang="es-CO" sz="3600" b="1" dirty="0">
+                <a:solidFill>
+                  <a:srgbClr val="002060"/>
+                </a:solidFill>
+                <a:latin typeface="Gabriola" panose="04040605051002020D02" pitchFamily="82" charset="0"/>
+                <a:cs typeface="DaunPenh" panose="01010101010101010101" pitchFamily="2" charset="0"/>
+              </a:rPr>
+              <a:t> (no acotadas).</a:t>
+            </a:r>
           </a:p>
         </p:txBody>
       </p:sp>
@@ -19623,25 +20216,6 @@
           <a:chExt cx="0" cy="0"/>
         </a:xfrm>
       </p:grpSpPr>
-      <p:sp>
-        <p:nvSpPr>
-          <p:cNvPr id="3" name="2 Marcador de texto"/>
-          <p:cNvSpPr>
-            <a:spLocks noGrp="1"/>
-          </p:cNvSpPr>
-          <p:nvPr>
-            <p:ph type="body" idx="1"/>
-          </p:nvPr>
-        </p:nvSpPr>
-        <p:spPr/>
-        <p:txBody>
-          <a:bodyPr/>
-          <a:lstStyle/>
-          <a:p>
-            <a:endParaRPr lang="es-CO" dirty="0"/>
-          </a:p>
-        </p:txBody>
-      </p:sp>
       <p:pic>
         <p:nvPicPr>
           <p:cNvPr id="4" name="Shape 143" descr="logosis1.png"/>
@@ -19658,8 +20232,8 @@
         </p:blipFill>
         <p:spPr>
           <a:xfrm>
-            <a:off x="6901818" y="3657601"/>
-            <a:ext cx="2242181" cy="1485899"/>
+            <a:off x="7308304" y="3723878"/>
+            <a:ext cx="1869442" cy="1406118"/>
           </a:xfrm>
           <a:prstGeom prst="rect">
             <a:avLst/>
@@ -19668,6 +20242,157 @@
           <a:ln>
             <a:noFill/>
           </a:ln>
+        </p:spPr>
+      </p:pic>
+      <p:sp>
+        <p:nvSpPr>
+          <p:cNvPr id="5" name="4 CuadroTexto"/>
+          <p:cNvSpPr txBox="1"/>
+          <p:nvPr/>
+        </p:nvSpPr>
+        <p:spPr>
+          <a:xfrm>
+            <a:off x="107504" y="51470"/>
+            <a:ext cx="7035823" cy="646331"/>
+          </a:xfrm>
+          <a:prstGeom prst="rect">
+            <a:avLst/>
+          </a:prstGeom>
+          <a:noFill/>
+        </p:spPr>
+        <p:txBody>
+          <a:bodyPr wrap="square" rtlCol="0">
+            <a:spAutoFit/>
+          </a:bodyPr>
+          <a:lstStyle/>
+          <a:p>
+            <a:r>
+              <a:rPr lang="es-ES" sz="3600" b="1" dirty="0">
+                <a:ln w="12700">
+                  <a:solidFill>
+                    <a:schemeClr val="tx2">
+                      <a:satMod val="155000"/>
+                    </a:schemeClr>
+                  </a:solidFill>
+                  <a:prstDash val="solid"/>
+                </a:ln>
+                <a:solidFill>
+                  <a:schemeClr val="tx1"/>
+                </a:solidFill>
+                <a:effectLst>
+                  <a:outerShdw blurRad="41275" dist="20320" dir="1800000" algn="tl" rotWithShape="0">
+                    <a:srgbClr val="000000">
+                      <a:alpha val="40000"/>
+                    </a:srgbClr>
+                  </a:outerShdw>
+                </a:effectLst>
+                <a:latin typeface="Rockwell" panose="02060603020205020403" pitchFamily="18" charset="0"/>
+              </a:rPr>
+              <a:t>Matriz de Adyacencia</a:t>
+            </a:r>
+            <a:endParaRPr lang="es-CO" sz="1200" dirty="0">
+              <a:latin typeface="Rockwell" panose="02060603020205020403" pitchFamily="18" charset="0"/>
+            </a:endParaRPr>
+          </a:p>
+        </p:txBody>
+      </p:sp>
+      <p:sp>
+        <p:nvSpPr>
+          <p:cNvPr id="6" name="6 CuadroTexto"/>
+          <p:cNvSpPr txBox="1"/>
+          <p:nvPr/>
+        </p:nvSpPr>
+        <p:spPr>
+          <a:xfrm>
+            <a:off x="107504" y="683860"/>
+            <a:ext cx="8100901" cy="1815882"/>
+          </a:xfrm>
+          <a:prstGeom prst="rect">
+            <a:avLst/>
+          </a:prstGeom>
+          <a:noFill/>
+        </p:spPr>
+        <p:txBody>
+          <a:bodyPr wrap="square" rtlCol="0">
+            <a:spAutoFit/>
+          </a:bodyPr>
+          <a:lstStyle/>
+          <a:p>
+            <a:r>
+              <a:rPr lang="es-CO" sz="2800" b="1" dirty="0">
+                <a:solidFill>
+                  <a:srgbClr val="002060"/>
+                </a:solidFill>
+                <a:latin typeface="Gabriola" panose="04040605051002020D02" pitchFamily="82" charset="0"/>
+                <a:cs typeface="DaunPenh" panose="01010101010101010101" pitchFamily="2" charset="0"/>
+              </a:rPr>
+              <a:t>Es una matriz cuadrada que se utiliza para representar relaciones binarias. Para un grafo G se asocia cada fila y cada columna a cada nodo del grafo, siendo los elementos de la matriz la relación entre los mismos, tomando los valores de</a:t>
+            </a:r>
+            <a:r>
+              <a:rPr lang="es-CO" sz="2800" b="1" dirty="0">
+                <a:solidFill>
+                  <a:srgbClr val="002060"/>
+                </a:solidFill>
+                <a:latin typeface="Rockwell" panose="02060603020205020403" pitchFamily="18" charset="0"/>
+                <a:cs typeface="DaunPenh" panose="01010101010101010101" pitchFamily="2" charset="0"/>
+              </a:rPr>
+              <a:t> 1 </a:t>
+            </a:r>
+            <a:r>
+              <a:rPr lang="es-CO" sz="2800" b="1" dirty="0">
+                <a:solidFill>
+                  <a:srgbClr val="002060"/>
+                </a:solidFill>
+                <a:latin typeface="Gabriola" panose="04040605051002020D02" pitchFamily="82" charset="0"/>
+                <a:cs typeface="DaunPenh" panose="01010101010101010101" pitchFamily="2" charset="0"/>
+              </a:rPr>
+              <a:t>si existe la arista y</a:t>
+            </a:r>
+            <a:r>
+              <a:rPr lang="es-CO" sz="2800" b="1" dirty="0">
+                <a:solidFill>
+                  <a:srgbClr val="002060"/>
+                </a:solidFill>
+                <a:latin typeface="Rockwell" panose="02060603020205020403" pitchFamily="18" charset="0"/>
+                <a:cs typeface="DaunPenh" panose="01010101010101010101" pitchFamily="2" charset="0"/>
+              </a:rPr>
+              <a:t> 0 </a:t>
+            </a:r>
+            <a:r>
+              <a:rPr lang="es-CO" sz="2800" b="1" dirty="0">
+                <a:solidFill>
+                  <a:srgbClr val="002060"/>
+                </a:solidFill>
+                <a:latin typeface="Gabriola" panose="04040605051002020D02" pitchFamily="82" charset="0"/>
+                <a:cs typeface="DaunPenh" panose="01010101010101010101" pitchFamily="2" charset="0"/>
+              </a:rPr>
+              <a:t>en caso contrario.</a:t>
+            </a:r>
+          </a:p>
+        </p:txBody>
+      </p:sp>
+      <p:pic>
+        <p:nvPicPr>
+          <p:cNvPr id="9" name="Imagen 8"/>
+          <p:cNvPicPr>
+            <a:picLocks noChangeAspect="1"/>
+          </p:cNvPicPr>
+          <p:nvPr/>
+        </p:nvPicPr>
+        <p:blipFill>
+          <a:blip r:embed="rId3"/>
+          <a:stretch>
+            <a:fillRect/>
+          </a:stretch>
+        </p:blipFill>
+        <p:spPr>
+          <a:xfrm>
+            <a:off x="539552" y="2643758"/>
+            <a:ext cx="5544616" cy="2355955"/>
+          </a:xfrm>
+          <a:prstGeom prst="rect">
+            <a:avLst/>
+          </a:prstGeom>
         </p:spPr>
       </p:pic>
     </p:spTree>

</xml_diff>